<commit_message>
Added slide of full stack of emulation
</commit_message>
<xml_diff>
--- a/Demo/BBCMicro.pptx
+++ b/Demo/BBCMicro.pptx
@@ -24,9 +24,10 @@
     <p:sldId id="280" r:id="rId18"/>
     <p:sldId id="279" r:id="rId19"/>
     <p:sldId id="282" r:id="rId20"/>
-    <p:sldId id="281" r:id="rId21"/>
-    <p:sldId id="277" r:id="rId22"/>
-    <p:sldId id="283" r:id="rId23"/>
+    <p:sldId id="284" r:id="rId21"/>
+    <p:sldId id="281" r:id="rId22"/>
+    <p:sldId id="277" r:id="rId23"/>
+    <p:sldId id="283" r:id="rId24"/>
   </p:sldIdLst>
   <p:sldSz cx="12192000" cy="6858000"/>
   <p:notesSz cx="6858000" cy="9144000"/>
@@ -6574,6 +6575,174 @@
               <a:rPr lang="en-US"/>
               <a:t>Fifth level</a:t>
             </a:r>
+            <a:endParaRPr lang="en-GB"/>
+          </a:p>
+        </p:txBody>
+      </p:sp>
+      <p:sp>
+        <p:nvSpPr>
+          <p:cNvPr id="4" name="Rectangle 3">
+            <a:extLst>
+              <a:ext uri="{FF2B5EF4-FFF2-40B4-BE49-F238E27FC236}">
+                <a16:creationId xmlns:a16="http://schemas.microsoft.com/office/drawing/2014/main" id="{7B8E15F6-56E1-400C-98A0-116798DB03C6}"/>
+              </a:ext>
+            </a:extLst>
+          </p:cNvPr>
+          <p:cNvSpPr/>
+          <p:nvPr userDrawn="1"/>
+        </p:nvSpPr>
+        <p:spPr>
+          <a:xfrm>
+            <a:off x="12435820" y="212756"/>
+            <a:ext cx="346450" cy="369168"/>
+          </a:xfrm>
+          <a:prstGeom prst="rect">
+            <a:avLst/>
+          </a:prstGeom>
+          <a:solidFill>
+            <a:srgbClr val="CCBDA6"/>
+          </a:solidFill>
+          <a:ln>
+            <a:solidFill>
+              <a:schemeClr val="bg2">
+                <a:lumMod val="75000"/>
+              </a:schemeClr>
+            </a:solidFill>
+          </a:ln>
+        </p:spPr>
+        <p:style>
+          <a:lnRef idx="2">
+            <a:schemeClr val="accent1">
+              <a:shade val="50000"/>
+            </a:schemeClr>
+          </a:lnRef>
+          <a:fillRef idx="1">
+            <a:schemeClr val="accent1"/>
+          </a:fillRef>
+          <a:effectRef idx="0">
+            <a:schemeClr val="accent1"/>
+          </a:effectRef>
+          <a:fontRef idx="minor">
+            <a:schemeClr val="lt1"/>
+          </a:fontRef>
+        </p:style>
+        <p:txBody>
+          <a:bodyPr rtlCol="0" anchor="ctr"/>
+          <a:lstStyle/>
+          <a:p>
+            <a:pPr algn="ctr"/>
+            <a:endParaRPr lang="en-GB"/>
+          </a:p>
+        </p:txBody>
+      </p:sp>
+      <p:sp>
+        <p:nvSpPr>
+          <p:cNvPr id="5" name="Rectangle 4">
+            <a:extLst>
+              <a:ext uri="{FF2B5EF4-FFF2-40B4-BE49-F238E27FC236}">
+                <a16:creationId xmlns:a16="http://schemas.microsoft.com/office/drawing/2014/main" id="{82BCF7BA-D022-49CD-BCA0-483A87C00555}"/>
+              </a:ext>
+            </a:extLst>
+          </p:cNvPr>
+          <p:cNvSpPr/>
+          <p:nvPr userDrawn="1"/>
+        </p:nvSpPr>
+        <p:spPr>
+          <a:xfrm>
+            <a:off x="12435820" y="887410"/>
+            <a:ext cx="346450" cy="369168"/>
+          </a:xfrm>
+          <a:prstGeom prst="rect">
+            <a:avLst/>
+          </a:prstGeom>
+          <a:solidFill>
+            <a:srgbClr val="BD3E15"/>
+          </a:solidFill>
+          <a:ln>
+            <a:solidFill>
+              <a:schemeClr val="bg2">
+                <a:lumMod val="75000"/>
+              </a:schemeClr>
+            </a:solidFill>
+          </a:ln>
+        </p:spPr>
+        <p:style>
+          <a:lnRef idx="2">
+            <a:schemeClr val="accent1">
+              <a:shade val="50000"/>
+            </a:schemeClr>
+          </a:lnRef>
+          <a:fillRef idx="1">
+            <a:schemeClr val="accent1"/>
+          </a:fillRef>
+          <a:effectRef idx="0">
+            <a:schemeClr val="accent1"/>
+          </a:effectRef>
+          <a:fontRef idx="minor">
+            <a:schemeClr val="lt1"/>
+          </a:fontRef>
+        </p:style>
+        <p:txBody>
+          <a:bodyPr rtlCol="0" anchor="ctr"/>
+          <a:lstStyle/>
+          <a:p>
+            <a:pPr algn="ctr"/>
+            <a:endParaRPr lang="en-GB"/>
+          </a:p>
+        </p:txBody>
+      </p:sp>
+      <p:sp>
+        <p:nvSpPr>
+          <p:cNvPr id="6" name="Rectangle 5">
+            <a:extLst>
+              <a:ext uri="{FF2B5EF4-FFF2-40B4-BE49-F238E27FC236}">
+                <a16:creationId xmlns:a16="http://schemas.microsoft.com/office/drawing/2014/main" id="{0529E9C0-5B12-4A79-BFD9-6FC91125D47A}"/>
+              </a:ext>
+            </a:extLst>
+          </p:cNvPr>
+          <p:cNvSpPr/>
+          <p:nvPr userDrawn="1"/>
+        </p:nvSpPr>
+        <p:spPr>
+          <a:xfrm>
+            <a:off x="12435820" y="1562064"/>
+            <a:ext cx="346450" cy="369168"/>
+          </a:xfrm>
+          <a:prstGeom prst="rect">
+            <a:avLst/>
+          </a:prstGeom>
+          <a:solidFill>
+            <a:srgbClr val="282514"/>
+          </a:solidFill>
+          <a:ln>
+            <a:solidFill>
+              <a:schemeClr val="bg2">
+                <a:lumMod val="75000"/>
+              </a:schemeClr>
+            </a:solidFill>
+          </a:ln>
+        </p:spPr>
+        <p:style>
+          <a:lnRef idx="2">
+            <a:schemeClr val="accent1">
+              <a:shade val="50000"/>
+            </a:schemeClr>
+          </a:lnRef>
+          <a:fillRef idx="1">
+            <a:schemeClr val="accent1"/>
+          </a:fillRef>
+          <a:effectRef idx="0">
+            <a:schemeClr val="accent1"/>
+          </a:effectRef>
+          <a:fontRef idx="minor">
+            <a:schemeClr val="lt1"/>
+          </a:fontRef>
+        </p:style>
+        <p:txBody>
+          <a:bodyPr rtlCol="0" anchor="ctr"/>
+          <a:lstStyle/>
+          <a:p>
+            <a:pPr algn="ctr"/>
             <a:endParaRPr lang="en-GB"/>
           </a:p>
         </p:txBody>
@@ -13384,10 +13553,10 @@
       </p:grpSpPr>
       <p:sp>
         <p:nvSpPr>
-          <p:cNvPr id="2" name="Title 1">
-            <a:extLst>
-              <a:ext uri="{FF2B5EF4-FFF2-40B4-BE49-F238E27FC236}">
-                <a16:creationId xmlns:a16="http://schemas.microsoft.com/office/drawing/2014/main" id="{67BE5B7F-94C7-4F2D-A1F6-27FA00D8AA73}"/>
+          <p:cNvPr id="4" name="Title 1">
+            <a:extLst>
+              <a:ext uri="{FF2B5EF4-FFF2-40B4-BE49-F238E27FC236}">
+                <a16:creationId xmlns:a16="http://schemas.microsoft.com/office/drawing/2014/main" id="{E5E083B1-CDE0-4B49-868F-09279383493B}"/>
               </a:ext>
             </a:extLst>
           </p:cNvPr>
@@ -13398,52 +13567,1022 @@
             <p:ph type="title"/>
           </p:nvPr>
         </p:nvSpPr>
-        <p:spPr/>
-        <p:txBody>
-          <a:bodyPr/>
+        <p:spPr>
+          <a:xfrm>
+            <a:off x="0" y="1"/>
+            <a:ext cx="11514614" cy="976108"/>
+          </a:xfrm>
+        </p:spPr>
+        <p:txBody>
+          <a:bodyPr>
+            <a:normAutofit/>
+          </a:bodyPr>
           <a:lstStyle/>
           <a:p>
             <a:r>
-              <a:rPr lang="en-GB" dirty="0"/>
-              <a:t>Demo 2 – Simple BBC Emu</a:t>
-            </a:r>
-          </a:p>
-        </p:txBody>
-      </p:sp>
-      <p:pic>
-        <p:nvPicPr>
-          <p:cNvPr id="3" name="Picture 2">
-            <a:extLst>
-              <a:ext uri="{FF2B5EF4-FFF2-40B4-BE49-F238E27FC236}">
-                <a16:creationId xmlns:a16="http://schemas.microsoft.com/office/drawing/2014/main" id="{B2D0FF90-9330-4E1A-9BEA-7AC88AE563D5}"/>
-              </a:ext>
-            </a:extLst>
-          </p:cNvPr>
-          <p:cNvPicPr>
-            <a:picLocks noChangeAspect="1"/>
-          </p:cNvPicPr>
+              <a:rPr lang="en-US" dirty="0"/>
+              <a:t>A Different Viewpoint</a:t>
+            </a:r>
+          </a:p>
+        </p:txBody>
+      </p:sp>
+      <p:grpSp>
+        <p:nvGrpSpPr>
+          <p:cNvPr id="7" name="Group 6">
+            <a:extLst>
+              <a:ext uri="{FF2B5EF4-FFF2-40B4-BE49-F238E27FC236}">
+                <a16:creationId xmlns:a16="http://schemas.microsoft.com/office/drawing/2014/main" id="{80523982-724D-45E1-A54F-6F493C6E78BB}"/>
+              </a:ext>
+            </a:extLst>
+          </p:cNvPr>
+          <p:cNvGrpSpPr/>
           <p:nvPr/>
-        </p:nvPicPr>
-        <p:blipFill>
-          <a:blip r:embed="rId2"/>
-          <a:stretch>
-            <a:fillRect/>
-          </a:stretch>
-        </p:blipFill>
-        <p:spPr>
-          <a:xfrm>
-            <a:off x="3147544" y="1646255"/>
-            <a:ext cx="4249194" cy="4857155"/>
-          </a:xfrm>
-          <a:prstGeom prst="rect">
-            <a:avLst/>
-          </a:prstGeom>
-        </p:spPr>
-      </p:pic>
+        </p:nvGrpSpPr>
+        <p:grpSpPr>
+          <a:xfrm>
+            <a:off x="1680963" y="1121142"/>
+            <a:ext cx="7211166" cy="5478315"/>
+            <a:chOff x="766563" y="1082814"/>
+            <a:chExt cx="7211166" cy="5478315"/>
+          </a:xfrm>
+        </p:grpSpPr>
+        <p:sp>
+          <p:nvSpPr>
+            <p:cNvPr id="26" name="TextBox 25">
+              <a:extLst>
+                <a:ext uri="{FF2B5EF4-FFF2-40B4-BE49-F238E27FC236}">
+                  <a16:creationId xmlns:a16="http://schemas.microsoft.com/office/drawing/2014/main" id="{237AF0D9-6DE3-4A45-BD53-91A4BB75D814}"/>
+                </a:ext>
+              </a:extLst>
+            </p:cNvPr>
+            <p:cNvSpPr txBox="1"/>
+            <p:nvPr/>
+          </p:nvSpPr>
+          <p:spPr>
+            <a:xfrm>
+              <a:off x="4371184" y="1082814"/>
+              <a:ext cx="1570673" cy="584775"/>
+            </a:xfrm>
+            <a:prstGeom prst="rect">
+              <a:avLst/>
+            </a:prstGeom>
+            <a:solidFill>
+              <a:srgbClr val="BD3E15"/>
+            </a:solidFill>
+          </p:spPr>
+          <p:txBody>
+            <a:bodyPr wrap="square">
+              <a:noAutofit/>
+            </a:bodyPr>
+            <a:lstStyle/>
+            <a:p>
+              <a:r>
+                <a:rPr lang="en-US" sz="1600" b="1" dirty="0">
+                  <a:solidFill>
+                    <a:schemeClr val="bg1"/>
+                  </a:solidFill>
+                  <a:latin typeface="Courier New" panose="02070309020205020404" pitchFamily="49" charset="0"/>
+                  <a:cs typeface="Courier New" panose="02070309020205020404" pitchFamily="49" charset="0"/>
+                </a:rPr>
+                <a:t>BBC Basic </a:t>
+              </a:r>
+              <a:r>
+                <a:rPr lang="en-US" sz="1600" b="1" dirty="0" err="1">
+                  <a:solidFill>
+                    <a:schemeClr val="bg1"/>
+                  </a:solidFill>
+                  <a:latin typeface="Courier New" panose="02070309020205020404" pitchFamily="49" charset="0"/>
+                  <a:cs typeface="Courier New" panose="02070309020205020404" pitchFamily="49" charset="0"/>
+                </a:rPr>
+                <a:t>programme</a:t>
+              </a:r>
+              <a:endParaRPr lang="en-GB" sz="1600" b="1" dirty="0">
+                <a:solidFill>
+                  <a:schemeClr val="bg1"/>
+                </a:solidFill>
+              </a:endParaRPr>
+            </a:p>
+          </p:txBody>
+        </p:sp>
+        <p:sp>
+          <p:nvSpPr>
+            <p:cNvPr id="27" name="TextBox 26">
+              <a:extLst>
+                <a:ext uri="{FF2B5EF4-FFF2-40B4-BE49-F238E27FC236}">
+                  <a16:creationId xmlns:a16="http://schemas.microsoft.com/office/drawing/2014/main" id="{1DB7981C-0928-45D2-8144-1FC242C2A0B3}"/>
+                </a:ext>
+              </a:extLst>
+            </p:cNvPr>
+            <p:cNvSpPr txBox="1"/>
+            <p:nvPr/>
+          </p:nvSpPr>
+          <p:spPr>
+            <a:xfrm>
+              <a:off x="4371184" y="1858121"/>
+              <a:ext cx="1588715" cy="584775"/>
+            </a:xfrm>
+            <a:prstGeom prst="rect">
+              <a:avLst/>
+            </a:prstGeom>
+            <a:solidFill>
+              <a:srgbClr val="BD3E15"/>
+            </a:solidFill>
+          </p:spPr>
+          <p:txBody>
+            <a:bodyPr wrap="square">
+              <a:noAutofit/>
+            </a:bodyPr>
+            <a:lstStyle/>
+            <a:p>
+              <a:r>
+                <a:rPr lang="en-US" sz="1600" b="1" dirty="0">
+                  <a:solidFill>
+                    <a:schemeClr val="bg1"/>
+                  </a:solidFill>
+                  <a:latin typeface="Courier New" panose="02070309020205020404" pitchFamily="49" charset="0"/>
+                  <a:cs typeface="Courier New" panose="02070309020205020404" pitchFamily="49" charset="0"/>
+                </a:rPr>
+                <a:t>Basic interpreter</a:t>
+              </a:r>
+              <a:endParaRPr lang="en-GB" sz="1600" b="1" dirty="0">
+                <a:solidFill>
+                  <a:schemeClr val="bg1"/>
+                </a:solidFill>
+              </a:endParaRPr>
+            </a:p>
+          </p:txBody>
+        </p:sp>
+        <p:sp>
+          <p:nvSpPr>
+            <p:cNvPr id="36" name="TextBox 35">
+              <a:extLst>
+                <a:ext uri="{FF2B5EF4-FFF2-40B4-BE49-F238E27FC236}">
+                  <a16:creationId xmlns:a16="http://schemas.microsoft.com/office/drawing/2014/main" id="{322B9A4E-3345-40D8-91F5-F3637A030C85}"/>
+                </a:ext>
+              </a:extLst>
+            </p:cNvPr>
+            <p:cNvSpPr txBox="1"/>
+            <p:nvPr/>
+          </p:nvSpPr>
+          <p:spPr>
+            <a:xfrm>
+              <a:off x="4371184" y="2633428"/>
+              <a:ext cx="1588715" cy="584775"/>
+            </a:xfrm>
+            <a:prstGeom prst="rect">
+              <a:avLst/>
+            </a:prstGeom>
+            <a:solidFill>
+              <a:srgbClr val="BD3E15"/>
+            </a:solidFill>
+          </p:spPr>
+          <p:txBody>
+            <a:bodyPr wrap="square">
+              <a:noAutofit/>
+            </a:bodyPr>
+            <a:lstStyle/>
+            <a:p>
+              <a:r>
+                <a:rPr lang="en-US" sz="1600" b="1" dirty="0">
+                  <a:solidFill>
+                    <a:schemeClr val="bg1"/>
+                  </a:solidFill>
+                  <a:latin typeface="Courier New" panose="02070309020205020404" pitchFamily="49" charset="0"/>
+                  <a:cs typeface="Courier New" panose="02070309020205020404" pitchFamily="49" charset="0"/>
+                </a:rPr>
+                <a:t>BBC OS</a:t>
+              </a:r>
+              <a:endParaRPr lang="en-GB" sz="1600" b="1" dirty="0">
+                <a:solidFill>
+                  <a:schemeClr val="bg1"/>
+                </a:solidFill>
+              </a:endParaRPr>
+            </a:p>
+          </p:txBody>
+        </p:sp>
+        <p:grpSp>
+          <p:nvGrpSpPr>
+            <p:cNvPr id="6" name="Group 5">
+              <a:extLst>
+                <a:ext uri="{FF2B5EF4-FFF2-40B4-BE49-F238E27FC236}">
+                  <a16:creationId xmlns:a16="http://schemas.microsoft.com/office/drawing/2014/main" id="{171F954F-C4F2-4CDE-882B-AEBCC9FE07C4}"/>
+                </a:ext>
+              </a:extLst>
+            </p:cNvPr>
+            <p:cNvGrpSpPr/>
+            <p:nvPr/>
+          </p:nvGrpSpPr>
+          <p:grpSpPr>
+            <a:xfrm>
+              <a:off x="2316115" y="3408735"/>
+              <a:ext cx="5661614" cy="813133"/>
+              <a:chOff x="2316115" y="3401262"/>
+              <a:chExt cx="5661614" cy="813133"/>
+            </a:xfrm>
+          </p:grpSpPr>
+          <p:sp>
+            <p:nvSpPr>
+              <p:cNvPr id="73" name="TextBox 72">
+                <a:extLst>
+                  <a:ext uri="{FF2B5EF4-FFF2-40B4-BE49-F238E27FC236}">
+                    <a16:creationId xmlns:a16="http://schemas.microsoft.com/office/drawing/2014/main" id="{AE14A281-F0E6-494E-B0F9-333E9F6D7488}"/>
+                  </a:ext>
+                </a:extLst>
+              </p:cNvPr>
+              <p:cNvSpPr txBox="1"/>
+              <p:nvPr/>
+            </p:nvSpPr>
+            <p:spPr>
+              <a:xfrm>
+                <a:off x="2316115" y="3401262"/>
+                <a:ext cx="5661614" cy="813133"/>
+              </a:xfrm>
+              <a:prstGeom prst="rect">
+                <a:avLst/>
+              </a:prstGeom>
+              <a:solidFill>
+                <a:srgbClr val="BD3E15"/>
+              </a:solidFill>
+            </p:spPr>
+            <p:txBody>
+              <a:bodyPr wrap="square">
+                <a:noAutofit/>
+              </a:bodyPr>
+              <a:lstStyle/>
+              <a:p>
+                <a:endParaRPr lang="en-GB" sz="1600" b="1" dirty="0">
+                  <a:solidFill>
+                    <a:schemeClr val="bg1"/>
+                  </a:solidFill>
+                </a:endParaRPr>
+              </a:p>
+            </p:txBody>
+          </p:sp>
+          <p:sp>
+            <p:nvSpPr>
+              <p:cNvPr id="65" name="TextBox 64">
+                <a:extLst>
+                  <a:ext uri="{FF2B5EF4-FFF2-40B4-BE49-F238E27FC236}">
+                    <a16:creationId xmlns:a16="http://schemas.microsoft.com/office/drawing/2014/main" id="{0EA33A62-95F3-4B26-B48E-30562DBBC885}"/>
+                  </a:ext>
+                </a:extLst>
+              </p:cNvPr>
+              <p:cNvSpPr txBox="1"/>
+              <p:nvPr/>
+            </p:nvSpPr>
+            <p:spPr>
+              <a:xfrm>
+                <a:off x="2442883" y="3521255"/>
+                <a:ext cx="1659702" cy="584775"/>
+              </a:xfrm>
+              <a:prstGeom prst="rect">
+                <a:avLst/>
+              </a:prstGeom>
+              <a:solidFill>
+                <a:schemeClr val="bg1"/>
+              </a:solidFill>
+              <a:ln w="6350">
+                <a:solidFill>
+                  <a:schemeClr val="tx1">
+                    <a:lumMod val="65000"/>
+                    <a:lumOff val="35000"/>
+                  </a:schemeClr>
+                </a:solidFill>
+              </a:ln>
+            </p:spPr>
+            <p:txBody>
+              <a:bodyPr wrap="square">
+                <a:noAutofit/>
+              </a:bodyPr>
+              <a:lstStyle>
+                <a:defPPr>
+                  <a:defRPr lang="en-US"/>
+                </a:defPPr>
+                <a:lvl1pPr>
+                  <a:defRPr sz="1600" b="1">
+                    <a:latin typeface="Courier New" panose="02070309020205020404" pitchFamily="49" charset="0"/>
+                    <a:cs typeface="Courier New" panose="02070309020205020404" pitchFamily="49" charset="0"/>
+                  </a:defRPr>
+                </a:lvl1pPr>
+              </a:lstStyle>
+              <a:p>
+                <a:r>
+                  <a:rPr lang="en-US" dirty="0"/>
+                  <a:t>6845 CRTC</a:t>
+                </a:r>
+                <a:endParaRPr lang="en-GB" dirty="0"/>
+              </a:p>
+            </p:txBody>
+          </p:sp>
+          <p:sp>
+            <p:nvSpPr>
+              <p:cNvPr id="35" name="TextBox 34">
+                <a:extLst>
+                  <a:ext uri="{FF2B5EF4-FFF2-40B4-BE49-F238E27FC236}">
+                    <a16:creationId xmlns:a16="http://schemas.microsoft.com/office/drawing/2014/main" id="{5AE90DDA-A258-4BFC-BC8B-5889CDB3ABED}"/>
+                  </a:ext>
+                </a:extLst>
+              </p:cNvPr>
+              <p:cNvSpPr txBox="1"/>
+              <p:nvPr/>
+            </p:nvSpPr>
+            <p:spPr>
+              <a:xfrm>
+                <a:off x="4371184" y="3522915"/>
+                <a:ext cx="1588715" cy="584775"/>
+              </a:xfrm>
+              <a:prstGeom prst="rect">
+                <a:avLst/>
+              </a:prstGeom>
+              <a:solidFill>
+                <a:schemeClr val="bg1"/>
+              </a:solidFill>
+              <a:ln w="6350">
+                <a:solidFill>
+                  <a:schemeClr val="tx1">
+                    <a:lumMod val="65000"/>
+                    <a:lumOff val="35000"/>
+                  </a:schemeClr>
+                </a:solidFill>
+              </a:ln>
+            </p:spPr>
+            <p:txBody>
+              <a:bodyPr wrap="square">
+                <a:noAutofit/>
+              </a:bodyPr>
+              <a:lstStyle>
+                <a:defPPr>
+                  <a:defRPr lang="en-US"/>
+                </a:defPPr>
+                <a:lvl1pPr>
+                  <a:defRPr sz="1600" b="1">
+                    <a:latin typeface="Courier New" panose="02070309020205020404" pitchFamily="49" charset="0"/>
+                    <a:cs typeface="Courier New" panose="02070309020205020404" pitchFamily="49" charset="0"/>
+                  </a:defRPr>
+                </a:lvl1pPr>
+              </a:lstStyle>
+              <a:p>
+                <a:r>
+                  <a:rPr lang="en-US" dirty="0"/>
+                  <a:t>6502 CPU</a:t>
+                </a:r>
+                <a:endParaRPr lang="en-GB" dirty="0"/>
+              </a:p>
+            </p:txBody>
+          </p:sp>
+          <p:sp>
+            <p:nvSpPr>
+              <p:cNvPr id="38" name="TextBox 37">
+                <a:extLst>
+                  <a:ext uri="{FF2B5EF4-FFF2-40B4-BE49-F238E27FC236}">
+                    <a16:creationId xmlns:a16="http://schemas.microsoft.com/office/drawing/2014/main" id="{ACEAD825-E9CD-4864-B586-2136ED0D87EC}"/>
+                  </a:ext>
+                </a:extLst>
+              </p:cNvPr>
+              <p:cNvSpPr txBox="1"/>
+              <p:nvPr/>
+            </p:nvSpPr>
+            <p:spPr>
+              <a:xfrm>
+                <a:off x="6171752" y="3521254"/>
+                <a:ext cx="1659702" cy="584775"/>
+              </a:xfrm>
+              <a:prstGeom prst="rect">
+                <a:avLst/>
+              </a:prstGeom>
+              <a:solidFill>
+                <a:schemeClr val="bg1"/>
+              </a:solidFill>
+              <a:ln w="6350">
+                <a:solidFill>
+                  <a:schemeClr val="tx1">
+                    <a:lumMod val="65000"/>
+                    <a:lumOff val="35000"/>
+                  </a:schemeClr>
+                </a:solidFill>
+              </a:ln>
+            </p:spPr>
+            <p:txBody>
+              <a:bodyPr wrap="square">
+                <a:noAutofit/>
+              </a:bodyPr>
+              <a:lstStyle>
+                <a:defPPr>
+                  <a:defRPr lang="en-US"/>
+                </a:defPPr>
+                <a:lvl1pPr>
+                  <a:defRPr sz="1600" b="1">
+                    <a:latin typeface="Courier New" panose="02070309020205020404" pitchFamily="49" charset="0"/>
+                    <a:cs typeface="Courier New" panose="02070309020205020404" pitchFamily="49" charset="0"/>
+                  </a:defRPr>
+                </a:lvl1pPr>
+              </a:lstStyle>
+              <a:p>
+                <a:r>
+                  <a:rPr lang="en-US" dirty="0"/>
+                  <a:t>Keyboard interface</a:t>
+                </a:r>
+                <a:endParaRPr lang="en-GB" dirty="0"/>
+              </a:p>
+            </p:txBody>
+          </p:sp>
+        </p:grpSp>
+        <p:sp>
+          <p:nvSpPr>
+            <p:cNvPr id="49" name="TextBox 48">
+              <a:extLst>
+                <a:ext uri="{FF2B5EF4-FFF2-40B4-BE49-F238E27FC236}">
+                  <a16:creationId xmlns:a16="http://schemas.microsoft.com/office/drawing/2014/main" id="{5E3F973A-9F15-4451-A7EE-6DBF4118F7C5}"/>
+                </a:ext>
+              </a:extLst>
+            </p:cNvPr>
+            <p:cNvSpPr txBox="1"/>
+            <p:nvPr/>
+          </p:nvSpPr>
+          <p:spPr>
+            <a:xfrm>
+              <a:off x="4371184" y="5201047"/>
+              <a:ext cx="1588715" cy="584775"/>
+            </a:xfrm>
+            <a:prstGeom prst="rect">
+              <a:avLst/>
+            </a:prstGeom>
+            <a:solidFill>
+              <a:schemeClr val="tx1"/>
+            </a:solidFill>
+          </p:spPr>
+          <p:txBody>
+            <a:bodyPr wrap="square">
+              <a:noAutofit/>
+            </a:bodyPr>
+            <a:lstStyle/>
+            <a:p>
+              <a:r>
+                <a:rPr lang="en-US" sz="1600" b="1" dirty="0">
+                  <a:solidFill>
+                    <a:schemeClr val="bg1"/>
+                  </a:solidFill>
+                  <a:latin typeface="Courier New" panose="02070309020205020404" pitchFamily="49" charset="0"/>
+                  <a:cs typeface="Courier New" panose="02070309020205020404" pitchFamily="49" charset="0"/>
+                </a:rPr>
+                <a:t>Windows OS</a:t>
+              </a:r>
+              <a:endParaRPr lang="en-GB" sz="1600" b="1" dirty="0">
+                <a:solidFill>
+                  <a:schemeClr val="bg1"/>
+                </a:solidFill>
+              </a:endParaRPr>
+            </a:p>
+          </p:txBody>
+        </p:sp>
+        <p:sp>
+          <p:nvSpPr>
+            <p:cNvPr id="60" name="TextBox 59">
+              <a:extLst>
+                <a:ext uri="{FF2B5EF4-FFF2-40B4-BE49-F238E27FC236}">
+                  <a16:creationId xmlns:a16="http://schemas.microsoft.com/office/drawing/2014/main" id="{0DD4385D-6BE1-46EE-8564-01DD0E7AAAA3}"/>
+                </a:ext>
+              </a:extLst>
+            </p:cNvPr>
+            <p:cNvSpPr txBox="1"/>
+            <p:nvPr/>
+          </p:nvSpPr>
+          <p:spPr>
+            <a:xfrm>
+              <a:off x="4371184" y="5976354"/>
+              <a:ext cx="1588715" cy="584775"/>
+            </a:xfrm>
+            <a:prstGeom prst="rect">
+              <a:avLst/>
+            </a:prstGeom>
+            <a:solidFill>
+              <a:schemeClr val="tx1"/>
+            </a:solidFill>
+          </p:spPr>
+          <p:txBody>
+            <a:bodyPr wrap="square">
+              <a:noAutofit/>
+            </a:bodyPr>
+            <a:lstStyle/>
+            <a:p>
+              <a:r>
+                <a:rPr lang="en-US" sz="1600" b="1" dirty="0">
+                  <a:solidFill>
+                    <a:schemeClr val="bg1"/>
+                  </a:solidFill>
+                  <a:latin typeface="Courier New" panose="02070309020205020404" pitchFamily="49" charset="0"/>
+                  <a:cs typeface="Courier New" panose="02070309020205020404" pitchFamily="49" charset="0"/>
+                </a:rPr>
+                <a:t>X86 CPU</a:t>
+              </a:r>
+              <a:endParaRPr lang="en-GB" sz="1600" b="1" dirty="0">
+                <a:solidFill>
+                  <a:schemeClr val="bg1"/>
+                </a:solidFill>
+              </a:endParaRPr>
+            </a:p>
+          </p:txBody>
+        </p:sp>
+        <p:sp>
+          <p:nvSpPr>
+            <p:cNvPr id="66" name="TextBox 65">
+              <a:extLst>
+                <a:ext uri="{FF2B5EF4-FFF2-40B4-BE49-F238E27FC236}">
+                  <a16:creationId xmlns:a16="http://schemas.microsoft.com/office/drawing/2014/main" id="{A13CFF3C-F942-405A-A469-EC1AD6063FEC}"/>
+                </a:ext>
+              </a:extLst>
+            </p:cNvPr>
+            <p:cNvSpPr txBox="1"/>
+            <p:nvPr/>
+          </p:nvSpPr>
+          <p:spPr>
+            <a:xfrm>
+              <a:off x="2758173" y="4425740"/>
+              <a:ext cx="1180356" cy="584775"/>
+            </a:xfrm>
+            <a:prstGeom prst="rect">
+              <a:avLst/>
+            </a:prstGeom>
+            <a:noFill/>
+          </p:spPr>
+          <p:txBody>
+            <a:bodyPr wrap="square">
+              <a:spAutoFit/>
+            </a:bodyPr>
+            <a:lstStyle/>
+            <a:p>
+              <a:r>
+                <a:rPr lang="en-US" sz="1600" b="1" dirty="0">
+                  <a:latin typeface="Courier New" panose="02070309020205020404" pitchFamily="49" charset="0"/>
+                  <a:cs typeface="Courier New" panose="02070309020205020404" pitchFamily="49" charset="0"/>
+                </a:rPr>
+                <a:t>C#/</a:t>
+              </a:r>
+              <a:r>
+                <a:rPr lang="en-US" sz="1600" b="1" dirty="0" err="1">
+                  <a:latin typeface="Courier New" panose="02070309020205020404" pitchFamily="49" charset="0"/>
+                  <a:cs typeface="Courier New" panose="02070309020205020404" pitchFamily="49" charset="0"/>
+                </a:rPr>
+                <a:t>.Net</a:t>
+              </a:r>
+              <a:r>
+                <a:rPr lang="en-US" sz="1600" b="1" dirty="0">
+                  <a:latin typeface="Courier New" panose="02070309020205020404" pitchFamily="49" charset="0"/>
+                  <a:cs typeface="Courier New" panose="02070309020205020404" pitchFamily="49" charset="0"/>
+                </a:rPr>
+                <a:t> Core</a:t>
+              </a:r>
+              <a:endParaRPr lang="en-GB" sz="1600" b="1" dirty="0"/>
+            </a:p>
+          </p:txBody>
+        </p:sp>
+        <p:grpSp>
+          <p:nvGrpSpPr>
+            <p:cNvPr id="3" name="Group 2">
+              <a:extLst>
+                <a:ext uri="{FF2B5EF4-FFF2-40B4-BE49-F238E27FC236}">
+                  <a16:creationId xmlns:a16="http://schemas.microsoft.com/office/drawing/2014/main" id="{8868A6BD-D6F9-4A45-A8E3-A2829F64BA15}"/>
+                </a:ext>
+              </a:extLst>
+            </p:cNvPr>
+            <p:cNvGrpSpPr/>
+            <p:nvPr/>
+          </p:nvGrpSpPr>
+          <p:grpSpPr>
+            <a:xfrm>
+              <a:off x="3993159" y="4412400"/>
+              <a:ext cx="2560953" cy="598115"/>
+              <a:chOff x="3905552" y="4245745"/>
+              <a:chExt cx="2560953" cy="598115"/>
+            </a:xfrm>
+          </p:grpSpPr>
+          <p:sp>
+            <p:nvSpPr>
+              <p:cNvPr id="43" name="TextBox 42">
+                <a:extLst>
+                  <a:ext uri="{FF2B5EF4-FFF2-40B4-BE49-F238E27FC236}">
+                    <a16:creationId xmlns:a16="http://schemas.microsoft.com/office/drawing/2014/main" id="{1CE8A4A0-D447-4603-A00F-3635770715B4}"/>
+                  </a:ext>
+                </a:extLst>
+              </p:cNvPr>
+              <p:cNvSpPr txBox="1"/>
+              <p:nvPr/>
+            </p:nvSpPr>
+            <p:spPr>
+              <a:xfrm>
+                <a:off x="3905552" y="4245745"/>
+                <a:ext cx="2560953" cy="598115"/>
+              </a:xfrm>
+              <a:prstGeom prst="rect">
+                <a:avLst/>
+              </a:prstGeom>
+              <a:solidFill>
+                <a:schemeClr val="tx1"/>
+              </a:solidFill>
+            </p:spPr>
+            <p:txBody>
+              <a:bodyPr wrap="square">
+                <a:noAutofit/>
+              </a:bodyPr>
+              <a:lstStyle/>
+              <a:p>
+                <a:endParaRPr lang="en-GB" sz="1600" b="1" dirty="0">
+                  <a:solidFill>
+                    <a:schemeClr val="bg1"/>
+                  </a:solidFill>
+                </a:endParaRPr>
+              </a:p>
+            </p:txBody>
+          </p:sp>
+          <p:sp>
+            <p:nvSpPr>
+              <p:cNvPr id="64" name="TextBox 63">
+                <a:extLst>
+                  <a:ext uri="{FF2B5EF4-FFF2-40B4-BE49-F238E27FC236}">
+                    <a16:creationId xmlns:a16="http://schemas.microsoft.com/office/drawing/2014/main" id="{AF5374CA-C253-458E-8EA8-C2B5C6A28C26}"/>
+                  </a:ext>
+                </a:extLst>
+              </p:cNvPr>
+              <p:cNvSpPr txBox="1"/>
+              <p:nvPr/>
+            </p:nvSpPr>
+            <p:spPr>
+              <a:xfrm>
+                <a:off x="4014813" y="4370015"/>
+                <a:ext cx="469580" cy="327920"/>
+              </a:xfrm>
+              <a:prstGeom prst="rect">
+                <a:avLst/>
+              </a:prstGeom>
+              <a:solidFill>
+                <a:schemeClr val="bg1"/>
+              </a:solidFill>
+              <a:ln w="6350">
+                <a:solidFill>
+                  <a:schemeClr val="tx1">
+                    <a:lumMod val="65000"/>
+                    <a:lumOff val="35000"/>
+                  </a:schemeClr>
+                </a:solidFill>
+              </a:ln>
+            </p:spPr>
+            <p:txBody>
+              <a:bodyPr wrap="square">
+                <a:noAutofit/>
+              </a:bodyPr>
+              <a:lstStyle/>
+              <a:p>
+                <a:r>
+                  <a:rPr lang="en-US" sz="1600" b="1" dirty="0">
+                    <a:latin typeface="Courier New" panose="02070309020205020404" pitchFamily="49" charset="0"/>
+                    <a:cs typeface="Courier New" panose="02070309020205020404" pitchFamily="49" charset="0"/>
+                  </a:rPr>
+                  <a:t>IL</a:t>
+                </a:r>
+                <a:endParaRPr lang="en-GB" sz="1600" b="1" dirty="0"/>
+              </a:p>
+            </p:txBody>
+          </p:sp>
+          <p:sp>
+            <p:nvSpPr>
+              <p:cNvPr id="69" name="TextBox 68">
+                <a:extLst>
+                  <a:ext uri="{FF2B5EF4-FFF2-40B4-BE49-F238E27FC236}">
+                    <a16:creationId xmlns:a16="http://schemas.microsoft.com/office/drawing/2014/main" id="{347EB9C2-C4F2-4028-8FFF-CCD3EAF5109E}"/>
+                  </a:ext>
+                </a:extLst>
+              </p:cNvPr>
+              <p:cNvSpPr txBox="1"/>
+              <p:nvPr/>
+            </p:nvSpPr>
+            <p:spPr>
+              <a:xfrm>
+                <a:off x="5354084" y="4370015"/>
+                <a:ext cx="953634" cy="327920"/>
+              </a:xfrm>
+              <a:prstGeom prst="rect">
+                <a:avLst/>
+              </a:prstGeom>
+              <a:solidFill>
+                <a:schemeClr val="bg1"/>
+              </a:solidFill>
+              <a:ln w="6350">
+                <a:solidFill>
+                  <a:schemeClr val="tx1">
+                    <a:lumMod val="65000"/>
+                    <a:lumOff val="35000"/>
+                  </a:schemeClr>
+                </a:solidFill>
+              </a:ln>
+            </p:spPr>
+            <p:txBody>
+              <a:bodyPr wrap="square">
+                <a:noAutofit/>
+              </a:bodyPr>
+              <a:lstStyle/>
+              <a:p>
+                <a:r>
+                  <a:rPr lang="en-US" sz="1600" b="1" dirty="0">
+                    <a:latin typeface="Courier New" panose="02070309020205020404" pitchFamily="49" charset="0"/>
+                    <a:cs typeface="Courier New" panose="02070309020205020404" pitchFamily="49" charset="0"/>
+                  </a:rPr>
+                  <a:t>X86 MC</a:t>
+                </a:r>
+                <a:endParaRPr lang="en-GB" sz="1600" b="1" dirty="0"/>
+              </a:p>
+            </p:txBody>
+          </p:sp>
+          <p:grpSp>
+            <p:nvGrpSpPr>
+              <p:cNvPr id="2" name="Group 1">
+                <a:extLst>
+                  <a:ext uri="{FF2B5EF4-FFF2-40B4-BE49-F238E27FC236}">
+                    <a16:creationId xmlns:a16="http://schemas.microsoft.com/office/drawing/2014/main" id="{B6C13115-87BD-4560-A3BC-A48FE47CBA84}"/>
+                  </a:ext>
+                </a:extLst>
+              </p:cNvPr>
+              <p:cNvGrpSpPr/>
+              <p:nvPr/>
+            </p:nvGrpSpPr>
+            <p:grpSpPr>
+              <a:xfrm>
+                <a:off x="4614244" y="4325879"/>
+                <a:ext cx="609593" cy="437762"/>
+                <a:chOff x="4614244" y="4325879"/>
+                <a:chExt cx="609593" cy="437762"/>
+              </a:xfrm>
+            </p:grpSpPr>
+            <p:sp>
+              <p:nvSpPr>
+                <p:cNvPr id="44" name="Arrow: Down 43">
+                  <a:extLst>
+                    <a:ext uri="{FF2B5EF4-FFF2-40B4-BE49-F238E27FC236}">
+                      <a16:creationId xmlns:a16="http://schemas.microsoft.com/office/drawing/2014/main" id="{D155E866-C5CA-4C40-89AB-43804112D9F1}"/>
+                    </a:ext>
+                  </a:extLst>
+                </p:cNvPr>
+                <p:cNvSpPr/>
+                <p:nvPr/>
+              </p:nvSpPr>
+              <p:spPr>
+                <a:xfrm rot="16200000">
+                  <a:off x="4700160" y="4256645"/>
+                  <a:ext cx="437762" cy="576230"/>
+                </a:xfrm>
+                <a:prstGeom prst="downArrow">
+                  <a:avLst/>
+                </a:prstGeom>
+                <a:solidFill>
+                  <a:schemeClr val="bg1"/>
+                </a:solidFill>
+                <a:ln>
+                  <a:solidFill>
+                    <a:schemeClr val="tx1">
+                      <a:lumMod val="75000"/>
+                      <a:lumOff val="25000"/>
+                    </a:schemeClr>
+                  </a:solidFill>
+                </a:ln>
+              </p:spPr>
+              <p:style>
+                <a:lnRef idx="2">
+                  <a:schemeClr val="accent1">
+                    <a:shade val="50000"/>
+                  </a:schemeClr>
+                </a:lnRef>
+                <a:fillRef idx="1">
+                  <a:schemeClr val="accent1"/>
+                </a:fillRef>
+                <a:effectRef idx="0">
+                  <a:schemeClr val="accent1"/>
+                </a:effectRef>
+                <a:fontRef idx="minor">
+                  <a:schemeClr val="lt1"/>
+                </a:fontRef>
+              </p:style>
+              <p:txBody>
+                <a:bodyPr rtlCol="0" anchor="ctr"/>
+                <a:lstStyle/>
+                <a:p>
+                  <a:pPr algn="ctr"/>
+                  <a:endParaRPr lang="en-GB" dirty="0"/>
+                </a:p>
+                <a:p>
+                  <a:pPr algn="ctr"/>
+                  <a:endParaRPr lang="en-GB" dirty="0"/>
+                </a:p>
+              </p:txBody>
+            </p:sp>
+            <p:sp>
+              <p:nvSpPr>
+                <p:cNvPr id="71" name="TextBox 70">
+                  <a:extLst>
+                    <a:ext uri="{FF2B5EF4-FFF2-40B4-BE49-F238E27FC236}">
+                      <a16:creationId xmlns:a16="http://schemas.microsoft.com/office/drawing/2014/main" id="{33AE99E7-4572-49B0-AEEE-8AE35843BF09}"/>
+                    </a:ext>
+                  </a:extLst>
+                </p:cNvPr>
+                <p:cNvSpPr txBox="1"/>
+                <p:nvPr/>
+              </p:nvSpPr>
+              <p:spPr>
+                <a:xfrm>
+                  <a:off x="4614244" y="4429391"/>
+                  <a:ext cx="609593" cy="327920"/>
+                </a:xfrm>
+                <a:prstGeom prst="rect">
+                  <a:avLst/>
+                </a:prstGeom>
+                <a:noFill/>
+                <a:ln w="6350">
+                  <a:solidFill>
+                    <a:schemeClr val="tx1">
+                      <a:lumMod val="65000"/>
+                      <a:lumOff val="35000"/>
+                    </a:schemeClr>
+                  </a:solidFill>
+                </a:ln>
+              </p:spPr>
+              <p:txBody>
+                <a:bodyPr wrap="square">
+                  <a:noAutofit/>
+                </a:bodyPr>
+                <a:lstStyle/>
+                <a:p>
+                  <a:r>
+                    <a:rPr lang="en-US" sz="1000" b="1" dirty="0">
+                      <a:latin typeface="Courier New" panose="02070309020205020404" pitchFamily="49" charset="0"/>
+                      <a:cs typeface="Courier New" panose="02070309020205020404" pitchFamily="49" charset="0"/>
+                    </a:rPr>
+                    <a:t>JIT</a:t>
+                  </a:r>
+                  <a:endParaRPr lang="en-GB" sz="1000" b="1" dirty="0"/>
+                </a:p>
+              </p:txBody>
+            </p:sp>
+          </p:grpSp>
+        </p:grpSp>
+        <p:sp>
+          <p:nvSpPr>
+            <p:cNvPr id="76" name="TextBox 75">
+              <a:extLst>
+                <a:ext uri="{FF2B5EF4-FFF2-40B4-BE49-F238E27FC236}">
+                  <a16:creationId xmlns:a16="http://schemas.microsoft.com/office/drawing/2014/main" id="{9F3AEFFC-4B1C-4043-BB89-3272FB7DA2E4}"/>
+                </a:ext>
+              </a:extLst>
+            </p:cNvPr>
+            <p:cNvSpPr txBox="1"/>
+            <p:nvPr/>
+          </p:nvSpPr>
+          <p:spPr>
+            <a:xfrm>
+              <a:off x="2502280" y="1113244"/>
+              <a:ext cx="1490879" cy="584775"/>
+            </a:xfrm>
+            <a:prstGeom prst="rect">
+              <a:avLst/>
+            </a:prstGeom>
+            <a:noFill/>
+          </p:spPr>
+          <p:txBody>
+            <a:bodyPr wrap="square">
+              <a:spAutoFit/>
+            </a:bodyPr>
+            <a:lstStyle/>
+            <a:p>
+              <a:r>
+                <a:rPr lang="en-US" sz="1600" b="1" dirty="0">
+                  <a:latin typeface="Courier New" panose="02070309020205020404" pitchFamily="49" charset="0"/>
+                  <a:cs typeface="Courier New" panose="02070309020205020404" pitchFamily="49" charset="0"/>
+                </a:rPr>
+                <a:t>Native BBC BASIC</a:t>
+              </a:r>
+              <a:endParaRPr lang="en-GB" sz="1600" b="1" dirty="0"/>
+            </a:p>
+          </p:txBody>
+        </p:sp>
+        <p:sp>
+          <p:nvSpPr>
+            <p:cNvPr id="78" name="TextBox 77">
+              <a:extLst>
+                <a:ext uri="{FF2B5EF4-FFF2-40B4-BE49-F238E27FC236}">
+                  <a16:creationId xmlns:a16="http://schemas.microsoft.com/office/drawing/2014/main" id="{3B7AF7B7-FE67-4B5E-B8A3-61A376034A22}"/>
+                </a:ext>
+              </a:extLst>
+            </p:cNvPr>
+            <p:cNvSpPr txBox="1"/>
+            <p:nvPr/>
+          </p:nvSpPr>
+          <p:spPr>
+            <a:xfrm>
+              <a:off x="2812803" y="1858120"/>
+              <a:ext cx="1180356" cy="584775"/>
+            </a:xfrm>
+            <a:prstGeom prst="rect">
+              <a:avLst/>
+            </a:prstGeom>
+            <a:noFill/>
+          </p:spPr>
+          <p:txBody>
+            <a:bodyPr wrap="square">
+              <a:spAutoFit/>
+            </a:bodyPr>
+            <a:lstStyle/>
+            <a:p>
+              <a:r>
+                <a:rPr lang="en-US" sz="1600" b="1" dirty="0">
+                  <a:latin typeface="Courier New" panose="02070309020205020404" pitchFamily="49" charset="0"/>
+                  <a:cs typeface="Courier New" panose="02070309020205020404" pitchFamily="49" charset="0"/>
+                </a:rPr>
+                <a:t>Native 6502 MC</a:t>
+              </a:r>
+              <a:endParaRPr lang="en-GB" sz="1600" b="1" dirty="0"/>
+            </a:p>
+          </p:txBody>
+        </p:sp>
+        <p:sp>
+          <p:nvSpPr>
+            <p:cNvPr id="79" name="TextBox 78">
+              <a:extLst>
+                <a:ext uri="{FF2B5EF4-FFF2-40B4-BE49-F238E27FC236}">
+                  <a16:creationId xmlns:a16="http://schemas.microsoft.com/office/drawing/2014/main" id="{46B7F2C7-C107-4E44-86F6-782181B474C0}"/>
+                </a:ext>
+              </a:extLst>
+            </p:cNvPr>
+            <p:cNvSpPr txBox="1"/>
+            <p:nvPr/>
+          </p:nvSpPr>
+          <p:spPr>
+            <a:xfrm>
+              <a:off x="2812803" y="2549630"/>
+              <a:ext cx="1180356" cy="584775"/>
+            </a:xfrm>
+            <a:prstGeom prst="rect">
+              <a:avLst/>
+            </a:prstGeom>
+            <a:noFill/>
+          </p:spPr>
+          <p:txBody>
+            <a:bodyPr wrap="square">
+              <a:spAutoFit/>
+            </a:bodyPr>
+            <a:lstStyle/>
+            <a:p>
+              <a:r>
+                <a:rPr lang="en-US" sz="1600" b="1" dirty="0">
+                  <a:latin typeface="Courier New" panose="02070309020205020404" pitchFamily="49" charset="0"/>
+                  <a:cs typeface="Courier New" panose="02070309020205020404" pitchFamily="49" charset="0"/>
+                </a:rPr>
+                <a:t>Native 6502 MC</a:t>
+              </a:r>
+              <a:endParaRPr lang="en-GB" sz="1600" b="1" dirty="0"/>
+            </a:p>
+          </p:txBody>
+        </p:sp>
+        <p:sp>
+          <p:nvSpPr>
+            <p:cNvPr id="80" name="TextBox 79">
+              <a:extLst>
+                <a:ext uri="{FF2B5EF4-FFF2-40B4-BE49-F238E27FC236}">
+                  <a16:creationId xmlns:a16="http://schemas.microsoft.com/office/drawing/2014/main" id="{82DB942A-4C02-4F96-ABC4-687A11C35C44}"/>
+                </a:ext>
+              </a:extLst>
+            </p:cNvPr>
+            <p:cNvSpPr txBox="1"/>
+            <p:nvPr/>
+          </p:nvSpPr>
+          <p:spPr>
+            <a:xfrm>
+              <a:off x="766563" y="3522913"/>
+              <a:ext cx="1337699" cy="584775"/>
+            </a:xfrm>
+            <a:prstGeom prst="rect">
+              <a:avLst/>
+            </a:prstGeom>
+            <a:noFill/>
+          </p:spPr>
+          <p:txBody>
+            <a:bodyPr wrap="square">
+              <a:spAutoFit/>
+            </a:bodyPr>
+            <a:lstStyle/>
+            <a:p>
+              <a:r>
+                <a:rPr lang="en-US" sz="1600" b="1" dirty="0">
+                  <a:latin typeface="Courier New" panose="02070309020205020404" pitchFamily="49" charset="0"/>
+                  <a:cs typeface="Courier New" panose="02070309020205020404" pitchFamily="49" charset="0"/>
+                </a:rPr>
+                <a:t>Hardware emulation</a:t>
+              </a:r>
+              <a:endParaRPr lang="en-GB" sz="1600" b="1" dirty="0"/>
+            </a:p>
+          </p:txBody>
+        </p:sp>
+      </p:grpSp>
     </p:spTree>
     <p:extLst>
       <p:ext uri="{BB962C8B-B14F-4D97-AF65-F5344CB8AC3E}">
-        <p14:creationId xmlns:p14="http://schemas.microsoft.com/office/powerpoint/2010/main" val="3298697150"/>
+        <p14:creationId xmlns:p14="http://schemas.microsoft.com/office/powerpoint/2010/main" val="1683887645"/>
       </p:ext>
     </p:extLst>
   </p:cSld>
@@ -13791,6 +14930,94 @@
 </file>
 
 <file path=ppt/slides/slide20.xml><?xml version="1.0" encoding="utf-8"?>
+<p:sld xmlns:a="http://schemas.openxmlformats.org/drawingml/2006/main" xmlns:r="http://schemas.openxmlformats.org/officeDocument/2006/relationships" xmlns:p="http://schemas.openxmlformats.org/presentationml/2006/main">
+  <p:cSld>
+    <p:spTree>
+      <p:nvGrpSpPr>
+        <p:cNvPr id="1" name=""/>
+        <p:cNvGrpSpPr/>
+        <p:nvPr/>
+      </p:nvGrpSpPr>
+      <p:grpSpPr>
+        <a:xfrm>
+          <a:off x="0" y="0"/>
+          <a:ext cx="0" cy="0"/>
+          <a:chOff x="0" y="0"/>
+          <a:chExt cx="0" cy="0"/>
+        </a:xfrm>
+      </p:grpSpPr>
+      <p:sp>
+        <p:nvSpPr>
+          <p:cNvPr id="2" name="Title 1">
+            <a:extLst>
+              <a:ext uri="{FF2B5EF4-FFF2-40B4-BE49-F238E27FC236}">
+                <a16:creationId xmlns:a16="http://schemas.microsoft.com/office/drawing/2014/main" id="{67BE5B7F-94C7-4F2D-A1F6-27FA00D8AA73}"/>
+              </a:ext>
+            </a:extLst>
+          </p:cNvPr>
+          <p:cNvSpPr>
+            <a:spLocks noGrp="1"/>
+          </p:cNvSpPr>
+          <p:nvPr>
+            <p:ph type="title"/>
+          </p:nvPr>
+        </p:nvSpPr>
+        <p:spPr/>
+        <p:txBody>
+          <a:bodyPr/>
+          <a:lstStyle/>
+          <a:p>
+            <a:r>
+              <a:rPr lang="en-GB" dirty="0"/>
+              <a:t>Demo 2 – Simple BBC Emu</a:t>
+            </a:r>
+          </a:p>
+        </p:txBody>
+      </p:sp>
+      <p:pic>
+        <p:nvPicPr>
+          <p:cNvPr id="3" name="Picture 2">
+            <a:extLst>
+              <a:ext uri="{FF2B5EF4-FFF2-40B4-BE49-F238E27FC236}">
+                <a16:creationId xmlns:a16="http://schemas.microsoft.com/office/drawing/2014/main" id="{B2D0FF90-9330-4E1A-9BEA-7AC88AE563D5}"/>
+              </a:ext>
+            </a:extLst>
+          </p:cNvPr>
+          <p:cNvPicPr>
+            <a:picLocks noChangeAspect="1"/>
+          </p:cNvPicPr>
+          <p:nvPr/>
+        </p:nvPicPr>
+        <p:blipFill>
+          <a:blip r:embed="rId2"/>
+          <a:stretch>
+            <a:fillRect/>
+          </a:stretch>
+        </p:blipFill>
+        <p:spPr>
+          <a:xfrm>
+            <a:off x="3147544" y="1646255"/>
+            <a:ext cx="4249194" cy="4857155"/>
+          </a:xfrm>
+          <a:prstGeom prst="rect">
+            <a:avLst/>
+          </a:prstGeom>
+        </p:spPr>
+      </p:pic>
+    </p:spTree>
+    <p:extLst>
+      <p:ext uri="{BB962C8B-B14F-4D97-AF65-F5344CB8AC3E}">
+        <p14:creationId xmlns:p14="http://schemas.microsoft.com/office/powerpoint/2010/main" val="3298697150"/>
+      </p:ext>
+    </p:extLst>
+  </p:cSld>
+  <p:clrMapOvr>
+    <a:masterClrMapping/>
+  </p:clrMapOvr>
+</p:sld>
+</file>
+
+<file path=ppt/slides/slide21.xml><?xml version="1.0" encoding="utf-8"?>
 <p:sld xmlns:a="http://schemas.openxmlformats.org/drawingml/2006/main" xmlns:r="http://schemas.openxmlformats.org/officeDocument/2006/relationships" xmlns:p="http://schemas.openxmlformats.org/presentationml/2006/main">
   <p:cSld>
     <p:spTree>
@@ -14733,7 +15960,7 @@
 </p:sld>
 </file>
 
-<file path=ppt/slides/slide21.xml><?xml version="1.0" encoding="utf-8"?>
+<file path=ppt/slides/slide22.xml><?xml version="1.0" encoding="utf-8"?>
 <p:sld xmlns:a="http://schemas.openxmlformats.org/drawingml/2006/main" xmlns:r="http://schemas.openxmlformats.org/officeDocument/2006/relationships" xmlns:p="http://schemas.openxmlformats.org/presentationml/2006/main">
   <p:cSld>
     <p:spTree>

</xml_diff>

<commit_message>
Tweaks to screen and initial (broken) interrupt handling
</commit_message>
<xml_diff>
--- a/Demo/BBCMicro.pptx
+++ b/Demo/BBCMicro.pptx
@@ -283,7 +283,7 @@
           <a:p>
             <a:fld id="{FC3A54DE-181B-4B15-AC9F-76A4975EEEF4}" type="datetimeFigureOut">
               <a:rPr lang="en-GB" smtClean="0"/>
-              <a:t>02/05/2021</a:t>
+              <a:t>03/05/2021</a:t>
             </a:fld>
             <a:endParaRPr lang="en-GB"/>
           </a:p>
@@ -651,7 +651,7 @@
           <a:p>
             <a:fld id="{FC3A54DE-181B-4B15-AC9F-76A4975EEEF4}" type="datetimeFigureOut">
               <a:rPr lang="en-GB" smtClean="0"/>
-              <a:t>02/05/2021</a:t>
+              <a:t>03/05/2021</a:t>
             </a:fld>
             <a:endParaRPr lang="en-GB"/>
           </a:p>
@@ -861,7 +861,7 @@
           <a:p>
             <a:fld id="{FC3A54DE-181B-4B15-AC9F-76A4975EEEF4}" type="datetimeFigureOut">
               <a:rPr lang="en-GB" smtClean="0"/>
-              <a:t>02/05/2021</a:t>
+              <a:t>03/05/2021</a:t>
             </a:fld>
             <a:endParaRPr lang="en-GB"/>
           </a:p>
@@ -1091,7 +1091,7 @@
           <a:p>
             <a:fld id="{2E5E7E82-7E5A-45F6-8227-4F6A79BA218D}" type="datetimeFigureOut">
               <a:rPr lang="en-GB" smtClean="0"/>
-              <a:t>02/05/2021</a:t>
+              <a:t>03/05/2021</a:t>
             </a:fld>
             <a:endParaRPr lang="en-GB"/>
           </a:p>
@@ -1315,7 +1315,7 @@
           <a:p>
             <a:fld id="{2E5E7E82-7E5A-45F6-8227-4F6A79BA218D}" type="datetimeFigureOut">
               <a:rPr lang="en-GB" smtClean="0"/>
-              <a:t>02/05/2021</a:t>
+              <a:t>03/05/2021</a:t>
             </a:fld>
             <a:endParaRPr lang="en-GB"/>
           </a:p>
@@ -1615,7 +1615,7 @@
           <a:p>
             <a:fld id="{2E5E7E82-7E5A-45F6-8227-4F6A79BA218D}" type="datetimeFigureOut">
               <a:rPr lang="en-GB" smtClean="0"/>
-              <a:t>02/05/2021</a:t>
+              <a:t>03/05/2021</a:t>
             </a:fld>
             <a:endParaRPr lang="en-GB"/>
           </a:p>
@@ -1907,7 +1907,7 @@
           <a:p>
             <a:fld id="{2E5E7E82-7E5A-45F6-8227-4F6A79BA218D}" type="datetimeFigureOut">
               <a:rPr lang="en-GB" smtClean="0"/>
-              <a:t>02/05/2021</a:t>
+              <a:t>03/05/2021</a:t>
             </a:fld>
             <a:endParaRPr lang="en-GB"/>
           </a:p>
@@ -2346,7 +2346,7 @@
           <a:p>
             <a:fld id="{2E5E7E82-7E5A-45F6-8227-4F6A79BA218D}" type="datetimeFigureOut">
               <a:rPr lang="en-GB" smtClean="0"/>
-              <a:t>02/05/2021</a:t>
+              <a:t>03/05/2021</a:t>
             </a:fld>
             <a:endParaRPr lang="en-GB"/>
           </a:p>
@@ -2521,7 +2521,7 @@
           <a:p>
             <a:fld id="{2E5E7E82-7E5A-45F6-8227-4F6A79BA218D}" type="datetimeFigureOut">
               <a:rPr lang="en-GB" smtClean="0"/>
-              <a:t>02/05/2021</a:t>
+              <a:t>03/05/2021</a:t>
             </a:fld>
             <a:endParaRPr lang="en-GB"/>
           </a:p>
@@ -2658,7 +2658,7 @@
           <a:p>
             <a:fld id="{2E5E7E82-7E5A-45F6-8227-4F6A79BA218D}" type="datetimeFigureOut">
               <a:rPr lang="en-GB" smtClean="0"/>
-              <a:t>02/05/2021</a:t>
+              <a:t>03/05/2021</a:t>
             </a:fld>
             <a:endParaRPr lang="en-GB"/>
           </a:p>
@@ -2995,7 +2995,7 @@
           <a:p>
             <a:fld id="{2E5E7E82-7E5A-45F6-8227-4F6A79BA218D}" type="datetimeFigureOut">
               <a:rPr lang="en-GB" smtClean="0"/>
-              <a:t>02/05/2021</a:t>
+              <a:t>03/05/2021</a:t>
             </a:fld>
             <a:endParaRPr lang="en-GB"/>
           </a:p>
@@ -3211,7 +3211,7 @@
           <a:p>
             <a:fld id="{FC3A54DE-181B-4B15-AC9F-76A4975EEEF4}" type="datetimeFigureOut">
               <a:rPr lang="en-GB" smtClean="0"/>
-              <a:t>02/05/2021</a:t>
+              <a:t>03/05/2021</a:t>
             </a:fld>
             <a:endParaRPr lang="en-GB"/>
           </a:p>
@@ -3508,7 +3508,7 @@
           <a:p>
             <a:fld id="{2E5E7E82-7E5A-45F6-8227-4F6A79BA218D}" type="datetimeFigureOut">
               <a:rPr lang="en-GB" smtClean="0"/>
-              <a:t>02/05/2021</a:t>
+              <a:t>03/05/2021</a:t>
             </a:fld>
             <a:endParaRPr lang="en-GB"/>
           </a:p>
@@ -3732,7 +3732,7 @@
           <a:p>
             <a:fld id="{2E5E7E82-7E5A-45F6-8227-4F6A79BA218D}" type="datetimeFigureOut">
               <a:rPr lang="en-GB" smtClean="0"/>
-              <a:t>02/05/2021</a:t>
+              <a:t>03/05/2021</a:t>
             </a:fld>
             <a:endParaRPr lang="en-GB"/>
           </a:p>
@@ -3966,7 +3966,7 @@
           <a:p>
             <a:fld id="{2E5E7E82-7E5A-45F6-8227-4F6A79BA218D}" type="datetimeFigureOut">
               <a:rPr lang="en-GB" smtClean="0"/>
-              <a:t>02/05/2021</a:t>
+              <a:t>03/05/2021</a:t>
             </a:fld>
             <a:endParaRPr lang="en-GB"/>
           </a:p>
@@ -4258,7 +4258,7 @@
           <a:p>
             <a:fld id="{FC3A54DE-181B-4B15-AC9F-76A4975EEEF4}" type="datetimeFigureOut">
               <a:rPr lang="en-GB" smtClean="0"/>
-              <a:t>02/05/2021</a:t>
+              <a:t>03/05/2021</a:t>
             </a:fld>
             <a:endParaRPr lang="en-GB"/>
           </a:p>
@@ -4526,7 +4526,7 @@
           <a:p>
             <a:fld id="{FC3A54DE-181B-4B15-AC9F-76A4975EEEF4}" type="datetimeFigureOut">
               <a:rPr lang="en-GB" smtClean="0"/>
-              <a:t>02/05/2021</a:t>
+              <a:t>03/05/2021</a:t>
             </a:fld>
             <a:endParaRPr lang="en-GB"/>
           </a:p>
@@ -4941,7 +4941,7 @@
           <a:p>
             <a:fld id="{FC3A54DE-181B-4B15-AC9F-76A4975EEEF4}" type="datetimeFigureOut">
               <a:rPr lang="en-GB" smtClean="0"/>
-              <a:t>02/05/2021</a:t>
+              <a:t>03/05/2021</a:t>
             </a:fld>
             <a:endParaRPr lang="en-GB"/>
           </a:p>
@@ -5083,7 +5083,7 @@
           <a:p>
             <a:fld id="{FC3A54DE-181B-4B15-AC9F-76A4975EEEF4}" type="datetimeFigureOut">
               <a:rPr lang="en-GB" smtClean="0"/>
-              <a:t>02/05/2021</a:t>
+              <a:t>03/05/2021</a:t>
             </a:fld>
             <a:endParaRPr lang="en-GB"/>
           </a:p>
@@ -5196,7 +5196,7 @@
           <a:p>
             <a:fld id="{FC3A54DE-181B-4B15-AC9F-76A4975EEEF4}" type="datetimeFigureOut">
               <a:rPr lang="en-GB" smtClean="0"/>
-              <a:t>02/05/2021</a:t>
+              <a:t>03/05/2021</a:t>
             </a:fld>
             <a:endParaRPr lang="en-GB"/>
           </a:p>
@@ -5509,7 +5509,7 @@
           <a:p>
             <a:fld id="{FC3A54DE-181B-4B15-AC9F-76A4975EEEF4}" type="datetimeFigureOut">
               <a:rPr lang="en-GB" smtClean="0"/>
-              <a:t>02/05/2021</a:t>
+              <a:t>03/05/2021</a:t>
             </a:fld>
             <a:endParaRPr lang="en-GB"/>
           </a:p>
@@ -5798,7 +5798,7 @@
           <a:p>
             <a:fld id="{FC3A54DE-181B-4B15-AC9F-76A4975EEEF4}" type="datetimeFigureOut">
               <a:rPr lang="en-GB" smtClean="0"/>
-              <a:t>02/05/2021</a:t>
+              <a:t>03/05/2021</a:t>
             </a:fld>
             <a:endParaRPr lang="en-GB"/>
           </a:p>
@@ -6041,7 +6041,7 @@
           <a:p>
             <a:fld id="{FC3A54DE-181B-4B15-AC9F-76A4975EEEF4}" type="datetimeFigureOut">
               <a:rPr lang="en-GB" smtClean="0"/>
-              <a:t>02/05/2021</a:t>
+              <a:t>03/05/2021</a:t>
             </a:fld>
             <a:endParaRPr lang="en-GB"/>
           </a:p>
@@ -7100,7 +7100,7 @@
         </p:spPr>
         <p:txBody>
           <a:bodyPr>
-            <a:normAutofit fontScale="90000"/>
+            <a:normAutofit/>
           </a:bodyPr>
           <a:lstStyle/>
           <a:p>
@@ -7566,7 +7566,7 @@
         </p:spPr>
         <p:txBody>
           <a:bodyPr>
-            <a:normAutofit fontScale="90000"/>
+            <a:normAutofit/>
           </a:bodyPr>
           <a:lstStyle/>
           <a:p>
@@ -8182,7 +8182,7 @@
         </p:spPr>
         <p:txBody>
           <a:bodyPr vert="horz" lIns="91440" tIns="45720" rIns="91440" bIns="45720" rtlCol="0" anchor="ctr">
-            <a:normAutofit fontScale="85000" lnSpcReduction="10000"/>
+            <a:normAutofit/>
           </a:bodyPr>
           <a:lstStyle>
             <a:lvl1pPr algn="l" defTabSz="914400" rtl="0" eaLnBrk="1" latinLnBrk="0" hangingPunct="1">
@@ -9238,7 +9238,7 @@
         </p:spPr>
         <p:txBody>
           <a:bodyPr>
-            <a:normAutofit fontScale="90000"/>
+            <a:normAutofit/>
           </a:bodyPr>
           <a:lstStyle/>
           <a:p>
@@ -11108,7 +11108,7 @@
         </p:spPr>
         <p:txBody>
           <a:bodyPr>
-            <a:normAutofit fontScale="90000"/>
+            <a:normAutofit/>
           </a:bodyPr>
           <a:lstStyle/>
           <a:p>
@@ -13586,12 +13586,166 @@
           </a:p>
         </p:txBody>
       </p:sp>
+      <p:sp>
+        <p:nvSpPr>
+          <p:cNvPr id="26" name="TextBox 25">
+            <a:extLst>
+              <a:ext uri="{FF2B5EF4-FFF2-40B4-BE49-F238E27FC236}">
+                <a16:creationId xmlns:a16="http://schemas.microsoft.com/office/drawing/2014/main" id="{237AF0D9-6DE3-4A45-BD53-91A4BB75D814}"/>
+              </a:ext>
+            </a:extLst>
+          </p:cNvPr>
+          <p:cNvSpPr txBox="1"/>
+          <p:nvPr/>
+        </p:nvSpPr>
+        <p:spPr>
+          <a:xfrm>
+            <a:off x="5285584" y="1121142"/>
+            <a:ext cx="1570673" cy="584775"/>
+          </a:xfrm>
+          <a:prstGeom prst="rect">
+            <a:avLst/>
+          </a:prstGeom>
+          <a:solidFill>
+            <a:srgbClr val="BD3E15"/>
+          </a:solidFill>
+        </p:spPr>
+        <p:txBody>
+          <a:bodyPr wrap="square">
+            <a:noAutofit/>
+          </a:bodyPr>
+          <a:lstStyle/>
+          <a:p>
+            <a:r>
+              <a:rPr lang="en-US" sz="1600" b="1" dirty="0">
+                <a:solidFill>
+                  <a:schemeClr val="bg1"/>
+                </a:solidFill>
+                <a:latin typeface="Courier New" panose="02070309020205020404" pitchFamily="49" charset="0"/>
+                <a:cs typeface="Courier New" panose="02070309020205020404" pitchFamily="49" charset="0"/>
+              </a:rPr>
+              <a:t>BBC Basic </a:t>
+            </a:r>
+            <a:r>
+              <a:rPr lang="en-US" sz="1600" b="1" dirty="0" err="1">
+                <a:solidFill>
+                  <a:schemeClr val="bg1"/>
+                </a:solidFill>
+                <a:latin typeface="Courier New" panose="02070309020205020404" pitchFamily="49" charset="0"/>
+                <a:cs typeface="Courier New" panose="02070309020205020404" pitchFamily="49" charset="0"/>
+              </a:rPr>
+              <a:t>programme</a:t>
+            </a:r>
+            <a:endParaRPr lang="en-GB" sz="1600" b="1" dirty="0">
+              <a:solidFill>
+                <a:schemeClr val="bg1"/>
+              </a:solidFill>
+            </a:endParaRPr>
+          </a:p>
+        </p:txBody>
+      </p:sp>
+      <p:sp>
+        <p:nvSpPr>
+          <p:cNvPr id="27" name="TextBox 26">
+            <a:extLst>
+              <a:ext uri="{FF2B5EF4-FFF2-40B4-BE49-F238E27FC236}">
+                <a16:creationId xmlns:a16="http://schemas.microsoft.com/office/drawing/2014/main" id="{1DB7981C-0928-45D2-8144-1FC242C2A0B3}"/>
+              </a:ext>
+            </a:extLst>
+          </p:cNvPr>
+          <p:cNvSpPr txBox="1"/>
+          <p:nvPr/>
+        </p:nvSpPr>
+        <p:spPr>
+          <a:xfrm>
+            <a:off x="5285584" y="1896449"/>
+            <a:ext cx="1588715" cy="584775"/>
+          </a:xfrm>
+          <a:prstGeom prst="rect">
+            <a:avLst/>
+          </a:prstGeom>
+          <a:solidFill>
+            <a:srgbClr val="BD3E15"/>
+          </a:solidFill>
+        </p:spPr>
+        <p:txBody>
+          <a:bodyPr wrap="square">
+            <a:noAutofit/>
+          </a:bodyPr>
+          <a:lstStyle/>
+          <a:p>
+            <a:r>
+              <a:rPr lang="en-US" sz="1600" b="1" dirty="0">
+                <a:solidFill>
+                  <a:schemeClr val="bg1"/>
+                </a:solidFill>
+                <a:latin typeface="Courier New" panose="02070309020205020404" pitchFamily="49" charset="0"/>
+                <a:cs typeface="Courier New" panose="02070309020205020404" pitchFamily="49" charset="0"/>
+              </a:rPr>
+              <a:t>Basic interpreter</a:t>
+            </a:r>
+            <a:endParaRPr lang="en-GB" sz="1600" b="1" dirty="0">
+              <a:solidFill>
+                <a:schemeClr val="bg1"/>
+              </a:solidFill>
+            </a:endParaRPr>
+          </a:p>
+        </p:txBody>
+      </p:sp>
+      <p:sp>
+        <p:nvSpPr>
+          <p:cNvPr id="36" name="TextBox 35">
+            <a:extLst>
+              <a:ext uri="{FF2B5EF4-FFF2-40B4-BE49-F238E27FC236}">
+                <a16:creationId xmlns:a16="http://schemas.microsoft.com/office/drawing/2014/main" id="{322B9A4E-3345-40D8-91F5-F3637A030C85}"/>
+              </a:ext>
+            </a:extLst>
+          </p:cNvPr>
+          <p:cNvSpPr txBox="1"/>
+          <p:nvPr/>
+        </p:nvSpPr>
+        <p:spPr>
+          <a:xfrm>
+            <a:off x="5285584" y="2671756"/>
+            <a:ext cx="1588715" cy="584775"/>
+          </a:xfrm>
+          <a:prstGeom prst="rect">
+            <a:avLst/>
+          </a:prstGeom>
+          <a:solidFill>
+            <a:srgbClr val="BD3E15"/>
+          </a:solidFill>
+        </p:spPr>
+        <p:txBody>
+          <a:bodyPr wrap="square">
+            <a:noAutofit/>
+          </a:bodyPr>
+          <a:lstStyle/>
+          <a:p>
+            <a:r>
+              <a:rPr lang="en-US" sz="1600" b="1" dirty="0">
+                <a:solidFill>
+                  <a:schemeClr val="bg1"/>
+                </a:solidFill>
+                <a:latin typeface="Courier New" panose="02070309020205020404" pitchFamily="49" charset="0"/>
+                <a:cs typeface="Courier New" panose="02070309020205020404" pitchFamily="49" charset="0"/>
+              </a:rPr>
+              <a:t>BBC OS</a:t>
+            </a:r>
+            <a:endParaRPr lang="en-GB" sz="1600" b="1" dirty="0">
+              <a:solidFill>
+                <a:schemeClr val="bg1"/>
+              </a:solidFill>
+            </a:endParaRPr>
+          </a:p>
+        </p:txBody>
+      </p:sp>
       <p:grpSp>
         <p:nvGrpSpPr>
-          <p:cNvPr id="7" name="Group 6">
-            <a:extLst>
-              <a:ext uri="{FF2B5EF4-FFF2-40B4-BE49-F238E27FC236}">
-                <a16:creationId xmlns:a16="http://schemas.microsoft.com/office/drawing/2014/main" id="{80523982-724D-45E1-A54F-6F493C6E78BB}"/>
+          <p:cNvPr id="6" name="Group 5">
+            <a:extLst>
+              <a:ext uri="{FF2B5EF4-FFF2-40B4-BE49-F238E27FC236}">
+                <a16:creationId xmlns:a16="http://schemas.microsoft.com/office/drawing/2014/main" id="{171F954F-C4F2-4CDE-882B-AEBCC9FE07C4}"/>
               </a:ext>
             </a:extLst>
           </p:cNvPr>
@@ -13600,18 +13754,18 @@
         </p:nvGrpSpPr>
         <p:grpSpPr>
           <a:xfrm>
-            <a:off x="1680963" y="1121142"/>
-            <a:ext cx="7211166" cy="5478315"/>
-            <a:chOff x="766563" y="1082814"/>
-            <a:chExt cx="7211166" cy="5478315"/>
+            <a:off x="3230515" y="3447063"/>
+            <a:ext cx="5661614" cy="813133"/>
+            <a:chOff x="2316115" y="3401262"/>
+            <a:chExt cx="5661614" cy="813133"/>
           </a:xfrm>
         </p:grpSpPr>
         <p:sp>
           <p:nvSpPr>
-            <p:cNvPr id="26" name="TextBox 25">
+            <p:cNvPr id="73" name="TextBox 72">
               <a:extLst>
                 <a:ext uri="{FF2B5EF4-FFF2-40B4-BE49-F238E27FC236}">
-                  <a16:creationId xmlns:a16="http://schemas.microsoft.com/office/drawing/2014/main" id="{237AF0D9-6DE3-4A45-BD53-91A4BB75D814}"/>
+                  <a16:creationId xmlns:a16="http://schemas.microsoft.com/office/drawing/2014/main" id="{AE14A281-F0E6-494E-B0F9-333E9F6D7488}"/>
                 </a:ext>
               </a:extLst>
             </p:cNvPr>
@@ -13620,8 +13774,8 @@
           </p:nvSpPr>
           <p:spPr>
             <a:xfrm>
-              <a:off x="4371184" y="1082814"/>
-              <a:ext cx="1570673" cy="584775"/>
+              <a:off x="2316115" y="3401262"/>
+              <a:ext cx="5661614" cy="813133"/>
             </a:xfrm>
             <a:prstGeom prst="rect">
               <a:avLst/>
@@ -13636,26 +13790,6 @@
             </a:bodyPr>
             <a:lstStyle/>
             <a:p>
-              <a:r>
-                <a:rPr lang="en-US" sz="1600" b="1" dirty="0">
-                  <a:solidFill>
-                    <a:schemeClr val="bg1"/>
-                  </a:solidFill>
-                  <a:latin typeface="Courier New" panose="02070309020205020404" pitchFamily="49" charset="0"/>
-                  <a:cs typeface="Courier New" panose="02070309020205020404" pitchFamily="49" charset="0"/>
-                </a:rPr>
-                <a:t>BBC Basic </a:t>
-              </a:r>
-              <a:r>
-                <a:rPr lang="en-US" sz="1600" b="1" dirty="0" err="1">
-                  <a:solidFill>
-                    <a:schemeClr val="bg1"/>
-                  </a:solidFill>
-                  <a:latin typeface="Courier New" panose="02070309020205020404" pitchFamily="49" charset="0"/>
-                  <a:cs typeface="Courier New" panose="02070309020205020404" pitchFamily="49" charset="0"/>
-                </a:rPr>
-                <a:t>programme</a:t>
-              </a:r>
               <a:endParaRPr lang="en-GB" sz="1600" b="1" dirty="0">
                 <a:solidFill>
                   <a:schemeClr val="bg1"/>
@@ -13666,10 +13800,10 @@
         </p:sp>
         <p:sp>
           <p:nvSpPr>
-            <p:cNvPr id="27" name="TextBox 26">
+            <p:cNvPr id="65" name="TextBox 64">
               <a:extLst>
                 <a:ext uri="{FF2B5EF4-FFF2-40B4-BE49-F238E27FC236}">
-                  <a16:creationId xmlns:a16="http://schemas.microsoft.com/office/drawing/2014/main" id="{1DB7981C-0928-45D2-8144-1FC242C2A0B3}"/>
+                  <a16:creationId xmlns:a16="http://schemas.microsoft.com/office/drawing/2014/main" id="{0EA33A62-95F3-4B26-B48E-30562DBBC885}"/>
                 </a:ext>
               </a:extLst>
             </p:cNvPr>
@@ -13678,46 +13812,54 @@
           </p:nvSpPr>
           <p:spPr>
             <a:xfrm>
-              <a:off x="4371184" y="1858121"/>
-              <a:ext cx="1588715" cy="584775"/>
+              <a:off x="2442883" y="3521255"/>
+              <a:ext cx="1659702" cy="584775"/>
             </a:xfrm>
             <a:prstGeom prst="rect">
               <a:avLst/>
             </a:prstGeom>
             <a:solidFill>
-              <a:srgbClr val="BD3E15"/>
+              <a:schemeClr val="bg1"/>
             </a:solidFill>
+            <a:ln w="6350">
+              <a:solidFill>
+                <a:schemeClr val="tx1">
+                  <a:lumMod val="65000"/>
+                  <a:lumOff val="35000"/>
+                </a:schemeClr>
+              </a:solidFill>
+            </a:ln>
           </p:spPr>
           <p:txBody>
             <a:bodyPr wrap="square">
               <a:noAutofit/>
             </a:bodyPr>
-            <a:lstStyle/>
+            <a:lstStyle>
+              <a:defPPr>
+                <a:defRPr lang="en-US"/>
+              </a:defPPr>
+              <a:lvl1pPr>
+                <a:defRPr sz="1600" b="1">
+                  <a:latin typeface="Courier New" panose="02070309020205020404" pitchFamily="49" charset="0"/>
+                  <a:cs typeface="Courier New" panose="02070309020205020404" pitchFamily="49" charset="0"/>
+                </a:defRPr>
+              </a:lvl1pPr>
+            </a:lstStyle>
             <a:p>
               <a:r>
-                <a:rPr lang="en-US" sz="1600" b="1" dirty="0">
-                  <a:solidFill>
-                    <a:schemeClr val="bg1"/>
-                  </a:solidFill>
-                  <a:latin typeface="Courier New" panose="02070309020205020404" pitchFamily="49" charset="0"/>
-                  <a:cs typeface="Courier New" panose="02070309020205020404" pitchFamily="49" charset="0"/>
-                </a:rPr>
-                <a:t>Basic interpreter</a:t>
+                <a:rPr lang="en-US" dirty="0"/>
+                <a:t>6845 CRTC</a:t>
               </a:r>
-              <a:endParaRPr lang="en-GB" sz="1600" b="1" dirty="0">
-                <a:solidFill>
-                  <a:schemeClr val="bg1"/>
-                </a:solidFill>
-              </a:endParaRPr>
+              <a:endParaRPr lang="en-GB" dirty="0"/>
             </a:p>
           </p:txBody>
         </p:sp>
         <p:sp>
           <p:nvSpPr>
-            <p:cNvPr id="36" name="TextBox 35">
+            <p:cNvPr id="35" name="TextBox 34">
               <a:extLst>
                 <a:ext uri="{FF2B5EF4-FFF2-40B4-BE49-F238E27FC236}">
-                  <a16:creationId xmlns:a16="http://schemas.microsoft.com/office/drawing/2014/main" id="{322B9A4E-3345-40D8-91F5-F3637A030C85}"/>
+                  <a16:creationId xmlns:a16="http://schemas.microsoft.com/office/drawing/2014/main" id="{5AE90DDA-A258-4BFC-BC8B-5889CDB3ABED}"/>
                 </a:ext>
               </a:extLst>
             </p:cNvPr>
@@ -13726,273 +13868,54 @@
           </p:nvSpPr>
           <p:spPr>
             <a:xfrm>
-              <a:off x="4371184" y="2633428"/>
+              <a:off x="4371184" y="3522915"/>
               <a:ext cx="1588715" cy="584775"/>
             </a:xfrm>
             <a:prstGeom prst="rect">
               <a:avLst/>
             </a:prstGeom>
             <a:solidFill>
-              <a:srgbClr val="BD3E15"/>
+              <a:schemeClr val="bg1"/>
             </a:solidFill>
+            <a:ln w="6350">
+              <a:solidFill>
+                <a:schemeClr val="tx1">
+                  <a:lumMod val="65000"/>
+                  <a:lumOff val="35000"/>
+                </a:schemeClr>
+              </a:solidFill>
+            </a:ln>
           </p:spPr>
           <p:txBody>
             <a:bodyPr wrap="square">
               <a:noAutofit/>
             </a:bodyPr>
-            <a:lstStyle/>
+            <a:lstStyle>
+              <a:defPPr>
+                <a:defRPr lang="en-US"/>
+              </a:defPPr>
+              <a:lvl1pPr>
+                <a:defRPr sz="1600" b="1">
+                  <a:latin typeface="Courier New" panose="02070309020205020404" pitchFamily="49" charset="0"/>
+                  <a:cs typeface="Courier New" panose="02070309020205020404" pitchFamily="49" charset="0"/>
+                </a:defRPr>
+              </a:lvl1pPr>
+            </a:lstStyle>
             <a:p>
               <a:r>
-                <a:rPr lang="en-US" sz="1600" b="1" dirty="0">
-                  <a:solidFill>
-                    <a:schemeClr val="bg1"/>
-                  </a:solidFill>
-                  <a:latin typeface="Courier New" panose="02070309020205020404" pitchFamily="49" charset="0"/>
-                  <a:cs typeface="Courier New" panose="02070309020205020404" pitchFamily="49" charset="0"/>
-                </a:rPr>
-                <a:t>BBC OS</a:t>
+                <a:rPr lang="en-US" dirty="0"/>
+                <a:t>6502 CPU</a:t>
               </a:r>
-              <a:endParaRPr lang="en-GB" sz="1600" b="1" dirty="0">
-                <a:solidFill>
-                  <a:schemeClr val="bg1"/>
-                </a:solidFill>
-              </a:endParaRPr>
+              <a:endParaRPr lang="en-GB" dirty="0"/>
             </a:p>
           </p:txBody>
         </p:sp>
-        <p:grpSp>
-          <p:nvGrpSpPr>
-            <p:cNvPr id="6" name="Group 5">
+        <p:sp>
+          <p:nvSpPr>
+            <p:cNvPr id="38" name="TextBox 37">
               <a:extLst>
                 <a:ext uri="{FF2B5EF4-FFF2-40B4-BE49-F238E27FC236}">
-                  <a16:creationId xmlns:a16="http://schemas.microsoft.com/office/drawing/2014/main" id="{171F954F-C4F2-4CDE-882B-AEBCC9FE07C4}"/>
-                </a:ext>
-              </a:extLst>
-            </p:cNvPr>
-            <p:cNvGrpSpPr/>
-            <p:nvPr/>
-          </p:nvGrpSpPr>
-          <p:grpSpPr>
-            <a:xfrm>
-              <a:off x="2316115" y="3408735"/>
-              <a:ext cx="5661614" cy="813133"/>
-              <a:chOff x="2316115" y="3401262"/>
-              <a:chExt cx="5661614" cy="813133"/>
-            </a:xfrm>
-          </p:grpSpPr>
-          <p:sp>
-            <p:nvSpPr>
-              <p:cNvPr id="73" name="TextBox 72">
-                <a:extLst>
-                  <a:ext uri="{FF2B5EF4-FFF2-40B4-BE49-F238E27FC236}">
-                    <a16:creationId xmlns:a16="http://schemas.microsoft.com/office/drawing/2014/main" id="{AE14A281-F0E6-494E-B0F9-333E9F6D7488}"/>
-                  </a:ext>
-                </a:extLst>
-              </p:cNvPr>
-              <p:cNvSpPr txBox="1"/>
-              <p:nvPr/>
-            </p:nvSpPr>
-            <p:spPr>
-              <a:xfrm>
-                <a:off x="2316115" y="3401262"/>
-                <a:ext cx="5661614" cy="813133"/>
-              </a:xfrm>
-              <a:prstGeom prst="rect">
-                <a:avLst/>
-              </a:prstGeom>
-              <a:solidFill>
-                <a:srgbClr val="BD3E15"/>
-              </a:solidFill>
-            </p:spPr>
-            <p:txBody>
-              <a:bodyPr wrap="square">
-                <a:noAutofit/>
-              </a:bodyPr>
-              <a:lstStyle/>
-              <a:p>
-                <a:endParaRPr lang="en-GB" sz="1600" b="1" dirty="0">
-                  <a:solidFill>
-                    <a:schemeClr val="bg1"/>
-                  </a:solidFill>
-                </a:endParaRPr>
-              </a:p>
-            </p:txBody>
-          </p:sp>
-          <p:sp>
-            <p:nvSpPr>
-              <p:cNvPr id="65" name="TextBox 64">
-                <a:extLst>
-                  <a:ext uri="{FF2B5EF4-FFF2-40B4-BE49-F238E27FC236}">
-                    <a16:creationId xmlns:a16="http://schemas.microsoft.com/office/drawing/2014/main" id="{0EA33A62-95F3-4B26-B48E-30562DBBC885}"/>
-                  </a:ext>
-                </a:extLst>
-              </p:cNvPr>
-              <p:cNvSpPr txBox="1"/>
-              <p:nvPr/>
-            </p:nvSpPr>
-            <p:spPr>
-              <a:xfrm>
-                <a:off x="2442883" y="3521255"/>
-                <a:ext cx="1659702" cy="584775"/>
-              </a:xfrm>
-              <a:prstGeom prst="rect">
-                <a:avLst/>
-              </a:prstGeom>
-              <a:solidFill>
-                <a:schemeClr val="bg1"/>
-              </a:solidFill>
-              <a:ln w="6350">
-                <a:solidFill>
-                  <a:schemeClr val="tx1">
-                    <a:lumMod val="65000"/>
-                    <a:lumOff val="35000"/>
-                  </a:schemeClr>
-                </a:solidFill>
-              </a:ln>
-            </p:spPr>
-            <p:txBody>
-              <a:bodyPr wrap="square">
-                <a:noAutofit/>
-              </a:bodyPr>
-              <a:lstStyle>
-                <a:defPPr>
-                  <a:defRPr lang="en-US"/>
-                </a:defPPr>
-                <a:lvl1pPr>
-                  <a:defRPr sz="1600" b="1">
-                    <a:latin typeface="Courier New" panose="02070309020205020404" pitchFamily="49" charset="0"/>
-                    <a:cs typeface="Courier New" panose="02070309020205020404" pitchFamily="49" charset="0"/>
-                  </a:defRPr>
-                </a:lvl1pPr>
-              </a:lstStyle>
-              <a:p>
-                <a:r>
-                  <a:rPr lang="en-US" dirty="0"/>
-                  <a:t>6845 CRTC</a:t>
-                </a:r>
-                <a:endParaRPr lang="en-GB" dirty="0"/>
-              </a:p>
-            </p:txBody>
-          </p:sp>
-          <p:sp>
-            <p:nvSpPr>
-              <p:cNvPr id="35" name="TextBox 34">
-                <a:extLst>
-                  <a:ext uri="{FF2B5EF4-FFF2-40B4-BE49-F238E27FC236}">
-                    <a16:creationId xmlns:a16="http://schemas.microsoft.com/office/drawing/2014/main" id="{5AE90DDA-A258-4BFC-BC8B-5889CDB3ABED}"/>
-                  </a:ext>
-                </a:extLst>
-              </p:cNvPr>
-              <p:cNvSpPr txBox="1"/>
-              <p:nvPr/>
-            </p:nvSpPr>
-            <p:spPr>
-              <a:xfrm>
-                <a:off x="4371184" y="3522915"/>
-                <a:ext cx="1588715" cy="584775"/>
-              </a:xfrm>
-              <a:prstGeom prst="rect">
-                <a:avLst/>
-              </a:prstGeom>
-              <a:solidFill>
-                <a:schemeClr val="bg1"/>
-              </a:solidFill>
-              <a:ln w="6350">
-                <a:solidFill>
-                  <a:schemeClr val="tx1">
-                    <a:lumMod val="65000"/>
-                    <a:lumOff val="35000"/>
-                  </a:schemeClr>
-                </a:solidFill>
-              </a:ln>
-            </p:spPr>
-            <p:txBody>
-              <a:bodyPr wrap="square">
-                <a:noAutofit/>
-              </a:bodyPr>
-              <a:lstStyle>
-                <a:defPPr>
-                  <a:defRPr lang="en-US"/>
-                </a:defPPr>
-                <a:lvl1pPr>
-                  <a:defRPr sz="1600" b="1">
-                    <a:latin typeface="Courier New" panose="02070309020205020404" pitchFamily="49" charset="0"/>
-                    <a:cs typeface="Courier New" panose="02070309020205020404" pitchFamily="49" charset="0"/>
-                  </a:defRPr>
-                </a:lvl1pPr>
-              </a:lstStyle>
-              <a:p>
-                <a:r>
-                  <a:rPr lang="en-US" dirty="0"/>
-                  <a:t>6502 CPU</a:t>
-                </a:r>
-                <a:endParaRPr lang="en-GB" dirty="0"/>
-              </a:p>
-            </p:txBody>
-          </p:sp>
-          <p:sp>
-            <p:nvSpPr>
-              <p:cNvPr id="38" name="TextBox 37">
-                <a:extLst>
-                  <a:ext uri="{FF2B5EF4-FFF2-40B4-BE49-F238E27FC236}">
-                    <a16:creationId xmlns:a16="http://schemas.microsoft.com/office/drawing/2014/main" id="{ACEAD825-E9CD-4864-B586-2136ED0D87EC}"/>
-                  </a:ext>
-                </a:extLst>
-              </p:cNvPr>
-              <p:cNvSpPr txBox="1"/>
-              <p:nvPr/>
-            </p:nvSpPr>
-            <p:spPr>
-              <a:xfrm>
-                <a:off x="6171752" y="3521254"/>
-                <a:ext cx="1659702" cy="584775"/>
-              </a:xfrm>
-              <a:prstGeom prst="rect">
-                <a:avLst/>
-              </a:prstGeom>
-              <a:solidFill>
-                <a:schemeClr val="bg1"/>
-              </a:solidFill>
-              <a:ln w="6350">
-                <a:solidFill>
-                  <a:schemeClr val="tx1">
-                    <a:lumMod val="65000"/>
-                    <a:lumOff val="35000"/>
-                  </a:schemeClr>
-                </a:solidFill>
-              </a:ln>
-            </p:spPr>
-            <p:txBody>
-              <a:bodyPr wrap="square">
-                <a:noAutofit/>
-              </a:bodyPr>
-              <a:lstStyle>
-                <a:defPPr>
-                  <a:defRPr lang="en-US"/>
-                </a:defPPr>
-                <a:lvl1pPr>
-                  <a:defRPr sz="1600" b="1">
-                    <a:latin typeface="Courier New" panose="02070309020205020404" pitchFamily="49" charset="0"/>
-                    <a:cs typeface="Courier New" panose="02070309020205020404" pitchFamily="49" charset="0"/>
-                  </a:defRPr>
-                </a:lvl1pPr>
-              </a:lstStyle>
-              <a:p>
-                <a:r>
-                  <a:rPr lang="en-US" dirty="0"/>
-                  <a:t>Keyboard interface</a:t>
-                </a:r>
-                <a:endParaRPr lang="en-GB" dirty="0"/>
-              </a:p>
-            </p:txBody>
-          </p:sp>
-        </p:grpSp>
-        <p:sp>
-          <p:nvSpPr>
-            <p:cNvPr id="49" name="TextBox 48">
-              <a:extLst>
-                <a:ext uri="{FF2B5EF4-FFF2-40B4-BE49-F238E27FC236}">
-                  <a16:creationId xmlns:a16="http://schemas.microsoft.com/office/drawing/2014/main" id="{5E3F973A-9F15-4451-A7EE-6DBF4118F7C5}"/>
+                  <a16:creationId xmlns:a16="http://schemas.microsoft.com/office/drawing/2014/main" id="{ACEAD825-E9CD-4864-B586-2136ED0D87EC}"/>
                 </a:ext>
               </a:extLst>
             </p:cNvPr>
@@ -14001,8 +13924,234 @@
           </p:nvSpPr>
           <p:spPr>
             <a:xfrm>
-              <a:off x="4371184" y="5201047"/>
-              <a:ext cx="1588715" cy="584775"/>
+              <a:off x="6171752" y="3521254"/>
+              <a:ext cx="1659702" cy="584775"/>
+            </a:xfrm>
+            <a:prstGeom prst="rect">
+              <a:avLst/>
+            </a:prstGeom>
+            <a:solidFill>
+              <a:schemeClr val="bg1"/>
+            </a:solidFill>
+            <a:ln w="6350">
+              <a:solidFill>
+                <a:schemeClr val="tx1">
+                  <a:lumMod val="65000"/>
+                  <a:lumOff val="35000"/>
+                </a:schemeClr>
+              </a:solidFill>
+            </a:ln>
+          </p:spPr>
+          <p:txBody>
+            <a:bodyPr wrap="square">
+              <a:noAutofit/>
+            </a:bodyPr>
+            <a:lstStyle>
+              <a:defPPr>
+                <a:defRPr lang="en-US"/>
+              </a:defPPr>
+              <a:lvl1pPr>
+                <a:defRPr sz="1600" b="1">
+                  <a:latin typeface="Courier New" panose="02070309020205020404" pitchFamily="49" charset="0"/>
+                  <a:cs typeface="Courier New" panose="02070309020205020404" pitchFamily="49" charset="0"/>
+                </a:defRPr>
+              </a:lvl1pPr>
+            </a:lstStyle>
+            <a:p>
+              <a:r>
+                <a:rPr lang="en-US" dirty="0"/>
+                <a:t>Keyboard interface</a:t>
+              </a:r>
+              <a:endParaRPr lang="en-GB" dirty="0"/>
+            </a:p>
+          </p:txBody>
+        </p:sp>
+      </p:grpSp>
+      <p:sp>
+        <p:nvSpPr>
+          <p:cNvPr id="49" name="TextBox 48">
+            <a:extLst>
+              <a:ext uri="{FF2B5EF4-FFF2-40B4-BE49-F238E27FC236}">
+                <a16:creationId xmlns:a16="http://schemas.microsoft.com/office/drawing/2014/main" id="{5E3F973A-9F15-4451-A7EE-6DBF4118F7C5}"/>
+              </a:ext>
+            </a:extLst>
+          </p:cNvPr>
+          <p:cNvSpPr txBox="1"/>
+          <p:nvPr/>
+        </p:nvSpPr>
+        <p:spPr>
+          <a:xfrm>
+            <a:off x="5285584" y="5239375"/>
+            <a:ext cx="1588715" cy="584775"/>
+          </a:xfrm>
+          <a:prstGeom prst="rect">
+            <a:avLst/>
+          </a:prstGeom>
+          <a:solidFill>
+            <a:schemeClr val="tx1"/>
+          </a:solidFill>
+        </p:spPr>
+        <p:txBody>
+          <a:bodyPr wrap="square">
+            <a:noAutofit/>
+          </a:bodyPr>
+          <a:lstStyle/>
+          <a:p>
+            <a:r>
+              <a:rPr lang="en-US" sz="1600" b="1" dirty="0">
+                <a:solidFill>
+                  <a:schemeClr val="bg1"/>
+                </a:solidFill>
+                <a:latin typeface="Courier New" panose="02070309020205020404" pitchFamily="49" charset="0"/>
+                <a:cs typeface="Courier New" panose="02070309020205020404" pitchFamily="49" charset="0"/>
+              </a:rPr>
+              <a:t>Windows OS</a:t>
+            </a:r>
+            <a:endParaRPr lang="en-GB" sz="1600" b="1" dirty="0">
+              <a:solidFill>
+                <a:schemeClr val="bg1"/>
+              </a:solidFill>
+            </a:endParaRPr>
+          </a:p>
+        </p:txBody>
+      </p:sp>
+      <p:sp>
+        <p:nvSpPr>
+          <p:cNvPr id="60" name="TextBox 59">
+            <a:extLst>
+              <a:ext uri="{FF2B5EF4-FFF2-40B4-BE49-F238E27FC236}">
+                <a16:creationId xmlns:a16="http://schemas.microsoft.com/office/drawing/2014/main" id="{0DD4385D-6BE1-46EE-8564-01DD0E7AAAA3}"/>
+              </a:ext>
+            </a:extLst>
+          </p:cNvPr>
+          <p:cNvSpPr txBox="1"/>
+          <p:nvPr/>
+        </p:nvSpPr>
+        <p:spPr>
+          <a:xfrm>
+            <a:off x="5285584" y="6014682"/>
+            <a:ext cx="1588715" cy="584775"/>
+          </a:xfrm>
+          <a:prstGeom prst="rect">
+            <a:avLst/>
+          </a:prstGeom>
+          <a:solidFill>
+            <a:schemeClr val="tx1"/>
+          </a:solidFill>
+        </p:spPr>
+        <p:txBody>
+          <a:bodyPr wrap="square">
+            <a:noAutofit/>
+          </a:bodyPr>
+          <a:lstStyle/>
+          <a:p>
+            <a:r>
+              <a:rPr lang="en-US" sz="1600" b="1" dirty="0">
+                <a:solidFill>
+                  <a:schemeClr val="bg1"/>
+                </a:solidFill>
+                <a:latin typeface="Courier New" panose="02070309020205020404" pitchFamily="49" charset="0"/>
+                <a:cs typeface="Courier New" panose="02070309020205020404" pitchFamily="49" charset="0"/>
+              </a:rPr>
+              <a:t>X86 CPU</a:t>
+            </a:r>
+            <a:endParaRPr lang="en-GB" sz="1600" b="1" dirty="0">
+              <a:solidFill>
+                <a:schemeClr val="bg1"/>
+              </a:solidFill>
+            </a:endParaRPr>
+          </a:p>
+        </p:txBody>
+      </p:sp>
+      <p:sp>
+        <p:nvSpPr>
+          <p:cNvPr id="66" name="TextBox 65">
+            <a:extLst>
+              <a:ext uri="{FF2B5EF4-FFF2-40B4-BE49-F238E27FC236}">
+                <a16:creationId xmlns:a16="http://schemas.microsoft.com/office/drawing/2014/main" id="{A13CFF3C-F942-405A-A469-EC1AD6063FEC}"/>
+              </a:ext>
+            </a:extLst>
+          </p:cNvPr>
+          <p:cNvSpPr txBox="1"/>
+          <p:nvPr/>
+        </p:nvSpPr>
+        <p:spPr>
+          <a:xfrm>
+            <a:off x="3672573" y="4464068"/>
+            <a:ext cx="1180356" cy="584775"/>
+          </a:xfrm>
+          <a:prstGeom prst="rect">
+            <a:avLst/>
+          </a:prstGeom>
+          <a:noFill/>
+        </p:spPr>
+        <p:txBody>
+          <a:bodyPr wrap="square">
+            <a:spAutoFit/>
+          </a:bodyPr>
+          <a:lstStyle/>
+          <a:p>
+            <a:r>
+              <a:rPr lang="en-US" sz="1600" b="1" dirty="0">
+                <a:latin typeface="Courier New" panose="02070309020205020404" pitchFamily="49" charset="0"/>
+                <a:cs typeface="Courier New" panose="02070309020205020404" pitchFamily="49" charset="0"/>
+              </a:rPr>
+              <a:t>C#/</a:t>
+            </a:r>
+            <a:r>
+              <a:rPr lang="en-US" sz="1600" b="1" dirty="0" err="1">
+                <a:latin typeface="Courier New" panose="02070309020205020404" pitchFamily="49" charset="0"/>
+                <a:cs typeface="Courier New" panose="02070309020205020404" pitchFamily="49" charset="0"/>
+              </a:rPr>
+              <a:t>.Net</a:t>
+            </a:r>
+            <a:r>
+              <a:rPr lang="en-US" sz="1600" b="1" dirty="0">
+                <a:latin typeface="Courier New" panose="02070309020205020404" pitchFamily="49" charset="0"/>
+                <a:cs typeface="Courier New" panose="02070309020205020404" pitchFamily="49" charset="0"/>
+              </a:rPr>
+              <a:t> Core</a:t>
+            </a:r>
+            <a:endParaRPr lang="en-GB" sz="1600" b="1" dirty="0"/>
+          </a:p>
+        </p:txBody>
+      </p:sp>
+      <p:grpSp>
+        <p:nvGrpSpPr>
+          <p:cNvPr id="3" name="Group 2">
+            <a:extLst>
+              <a:ext uri="{FF2B5EF4-FFF2-40B4-BE49-F238E27FC236}">
+                <a16:creationId xmlns:a16="http://schemas.microsoft.com/office/drawing/2014/main" id="{8868A6BD-D6F9-4A45-A8E3-A2829F64BA15}"/>
+              </a:ext>
+            </a:extLst>
+          </p:cNvPr>
+          <p:cNvGrpSpPr/>
+          <p:nvPr/>
+        </p:nvGrpSpPr>
+        <p:grpSpPr>
+          <a:xfrm>
+            <a:off x="4907559" y="4450728"/>
+            <a:ext cx="2560953" cy="598115"/>
+            <a:chOff x="3905552" y="4245745"/>
+            <a:chExt cx="2560953" cy="598115"/>
+          </a:xfrm>
+        </p:grpSpPr>
+        <p:sp>
+          <p:nvSpPr>
+            <p:cNvPr id="43" name="TextBox 42">
+              <a:extLst>
+                <a:ext uri="{FF2B5EF4-FFF2-40B4-BE49-F238E27FC236}">
+                  <a16:creationId xmlns:a16="http://schemas.microsoft.com/office/drawing/2014/main" id="{1CE8A4A0-D447-4603-A00F-3635770715B4}"/>
+                </a:ext>
+              </a:extLst>
+            </p:cNvPr>
+            <p:cNvSpPr txBox="1"/>
+            <p:nvPr/>
+          </p:nvSpPr>
+          <p:spPr>
+            <a:xfrm>
+              <a:off x="3905552" y="4245745"/>
+              <a:ext cx="2560953" cy="598115"/>
             </a:xfrm>
             <a:prstGeom prst="rect">
               <a:avLst/>
@@ -14017,16 +14166,6 @@
             </a:bodyPr>
             <a:lstStyle/>
             <a:p>
-              <a:r>
-                <a:rPr lang="en-US" sz="1600" b="1" dirty="0">
-                  <a:solidFill>
-                    <a:schemeClr val="bg1"/>
-                  </a:solidFill>
-                  <a:latin typeface="Courier New" panose="02070309020205020404" pitchFamily="49" charset="0"/>
-                  <a:cs typeface="Courier New" panose="02070309020205020404" pitchFamily="49" charset="0"/>
-                </a:rPr>
-                <a:t>Windows OS</a:t>
-              </a:r>
               <a:endParaRPr lang="en-GB" sz="1600" b="1" dirty="0">
                 <a:solidFill>
                   <a:schemeClr val="bg1"/>
@@ -14037,10 +14176,10 @@
         </p:sp>
         <p:sp>
           <p:nvSpPr>
-            <p:cNvPr id="60" name="TextBox 59">
+            <p:cNvPr id="64" name="TextBox 63">
               <a:extLst>
                 <a:ext uri="{FF2B5EF4-FFF2-40B4-BE49-F238E27FC236}">
-                  <a16:creationId xmlns:a16="http://schemas.microsoft.com/office/drawing/2014/main" id="{0DD4385D-6BE1-46EE-8564-01DD0E7AAAA3}"/>
+                  <a16:creationId xmlns:a16="http://schemas.microsoft.com/office/drawing/2014/main" id="{AF5374CA-C253-458E-8EA8-C2B5C6A28C26}"/>
                 </a:ext>
               </a:extLst>
             </p:cNvPr>
@@ -14049,15 +14188,23 @@
           </p:nvSpPr>
           <p:spPr>
             <a:xfrm>
-              <a:off x="4371184" y="5976354"/>
-              <a:ext cx="1588715" cy="584775"/>
+              <a:off x="4014813" y="4370015"/>
+              <a:ext cx="469580" cy="327920"/>
             </a:xfrm>
             <a:prstGeom prst="rect">
               <a:avLst/>
             </a:prstGeom>
             <a:solidFill>
-              <a:schemeClr val="tx1"/>
+              <a:schemeClr val="bg1"/>
             </a:solidFill>
+            <a:ln w="6350">
+              <a:solidFill>
+                <a:schemeClr val="tx1">
+                  <a:lumMod val="65000"/>
+                  <a:lumOff val="35000"/>
+                </a:schemeClr>
+              </a:solidFill>
+            </a:ln>
           </p:spPr>
           <p:txBody>
             <a:bodyPr wrap="square">
@@ -14067,28 +14214,21 @@
             <a:p>
               <a:r>
                 <a:rPr lang="en-US" sz="1600" b="1" dirty="0">
-                  <a:solidFill>
-                    <a:schemeClr val="bg1"/>
-                  </a:solidFill>
                   <a:latin typeface="Courier New" panose="02070309020205020404" pitchFamily="49" charset="0"/>
                   <a:cs typeface="Courier New" panose="02070309020205020404" pitchFamily="49" charset="0"/>
                 </a:rPr>
-                <a:t>X86 CPU</a:t>
+                <a:t>IL</a:t>
               </a:r>
-              <a:endParaRPr lang="en-GB" sz="1600" b="1" dirty="0">
-                <a:solidFill>
-                  <a:schemeClr val="bg1"/>
-                </a:solidFill>
-              </a:endParaRPr>
+              <a:endParaRPr lang="en-GB" sz="1600" b="1" dirty="0"/>
             </a:p>
           </p:txBody>
         </p:sp>
         <p:sp>
           <p:nvSpPr>
-            <p:cNvPr id="66" name="TextBox 65">
+            <p:cNvPr id="69" name="TextBox 68">
               <a:extLst>
                 <a:ext uri="{FF2B5EF4-FFF2-40B4-BE49-F238E27FC236}">
-                  <a16:creationId xmlns:a16="http://schemas.microsoft.com/office/drawing/2014/main" id="{A13CFF3C-F942-405A-A469-EC1AD6063FEC}"/>
+                  <a16:creationId xmlns:a16="http://schemas.microsoft.com/office/drawing/2014/main" id="{347EB9C2-C4F2-4028-8FFF-CCD3EAF5109E}"/>
                 </a:ext>
               </a:extLst>
             </p:cNvPr>
@@ -14097,17 +14237,27 @@
           </p:nvSpPr>
           <p:spPr>
             <a:xfrm>
-              <a:off x="2758173" y="4425740"/>
-              <a:ext cx="1180356" cy="584775"/>
+              <a:off x="5354084" y="4370015"/>
+              <a:ext cx="953634" cy="327920"/>
             </a:xfrm>
             <a:prstGeom prst="rect">
               <a:avLst/>
             </a:prstGeom>
-            <a:noFill/>
+            <a:solidFill>
+              <a:schemeClr val="bg1"/>
+            </a:solidFill>
+            <a:ln w="6350">
+              <a:solidFill>
+                <a:schemeClr val="tx1">
+                  <a:lumMod val="65000"/>
+                  <a:lumOff val="35000"/>
+                </a:schemeClr>
+              </a:solidFill>
+            </a:ln>
           </p:spPr>
           <p:txBody>
             <a:bodyPr wrap="square">
-              <a:spAutoFit/>
+              <a:noAutofit/>
             </a:bodyPr>
             <a:lstStyle/>
             <a:p>
@@ -14116,21 +14266,7 @@
                   <a:latin typeface="Courier New" panose="02070309020205020404" pitchFamily="49" charset="0"/>
                   <a:cs typeface="Courier New" panose="02070309020205020404" pitchFamily="49" charset="0"/>
                 </a:rPr>
-                <a:t>C#/</a:t>
-              </a:r>
-              <a:r>
-                <a:rPr lang="en-US" sz="1600" b="1" dirty="0" err="1">
-                  <a:latin typeface="Courier New" panose="02070309020205020404" pitchFamily="49" charset="0"/>
-                  <a:cs typeface="Courier New" panose="02070309020205020404" pitchFamily="49" charset="0"/>
-                </a:rPr>
-                <a:t>.Net</a:t>
-              </a:r>
-              <a:r>
-                <a:rPr lang="en-US" sz="1600" b="1" dirty="0">
-                  <a:latin typeface="Courier New" panose="02070309020205020404" pitchFamily="49" charset="0"/>
-                  <a:cs typeface="Courier New" panose="02070309020205020404" pitchFamily="49" charset="0"/>
-                </a:rPr>
-                <a:t> Core</a:t>
+                <a:t>X86 MC</a:t>
               </a:r>
               <a:endParaRPr lang="en-GB" sz="1600" b="1" dirty="0"/>
             </a:p>
@@ -14138,10 +14274,10 @@
         </p:sp>
         <p:grpSp>
           <p:nvGrpSpPr>
-            <p:cNvPr id="3" name="Group 2">
+            <p:cNvPr id="2" name="Group 1">
               <a:extLst>
                 <a:ext uri="{FF2B5EF4-FFF2-40B4-BE49-F238E27FC236}">
-                  <a16:creationId xmlns:a16="http://schemas.microsoft.com/office/drawing/2014/main" id="{8868A6BD-D6F9-4A45-A8E3-A2829F64BA15}"/>
+                  <a16:creationId xmlns:a16="http://schemas.microsoft.com/office/drawing/2014/main" id="{B6C13115-87BD-4560-A3BC-A48FE47CBA84}"/>
                 </a:ext>
               </a:extLst>
             </p:cNvPr>
@@ -14150,18 +14286,79 @@
           </p:nvGrpSpPr>
           <p:grpSpPr>
             <a:xfrm>
-              <a:off x="3993159" y="4412400"/>
-              <a:ext cx="2560953" cy="598115"/>
-              <a:chOff x="3905552" y="4245745"/>
-              <a:chExt cx="2560953" cy="598115"/>
+              <a:off x="4614244" y="4325879"/>
+              <a:ext cx="609593" cy="437762"/>
+              <a:chOff x="4614244" y="4325879"/>
+              <a:chExt cx="609593" cy="437762"/>
             </a:xfrm>
           </p:grpSpPr>
           <p:sp>
             <p:nvSpPr>
-              <p:cNvPr id="43" name="TextBox 42">
+              <p:cNvPr id="44" name="Arrow: Down 43">
                 <a:extLst>
                   <a:ext uri="{FF2B5EF4-FFF2-40B4-BE49-F238E27FC236}">
-                    <a16:creationId xmlns:a16="http://schemas.microsoft.com/office/drawing/2014/main" id="{1CE8A4A0-D447-4603-A00F-3635770715B4}"/>
+                    <a16:creationId xmlns:a16="http://schemas.microsoft.com/office/drawing/2014/main" id="{D155E866-C5CA-4C40-89AB-43804112D9F1}"/>
+                  </a:ext>
+                </a:extLst>
+              </p:cNvPr>
+              <p:cNvSpPr/>
+              <p:nvPr/>
+            </p:nvSpPr>
+            <p:spPr>
+              <a:xfrm rot="16200000">
+                <a:off x="4700160" y="4256645"/>
+                <a:ext cx="437762" cy="576230"/>
+              </a:xfrm>
+              <a:prstGeom prst="downArrow">
+                <a:avLst/>
+              </a:prstGeom>
+              <a:solidFill>
+                <a:schemeClr val="bg1"/>
+              </a:solidFill>
+              <a:ln>
+                <a:solidFill>
+                  <a:schemeClr val="tx1">
+                    <a:lumMod val="75000"/>
+                    <a:lumOff val="25000"/>
+                  </a:schemeClr>
+                </a:solidFill>
+              </a:ln>
+            </p:spPr>
+            <p:style>
+              <a:lnRef idx="2">
+                <a:schemeClr val="accent1">
+                  <a:shade val="50000"/>
+                </a:schemeClr>
+              </a:lnRef>
+              <a:fillRef idx="1">
+                <a:schemeClr val="accent1"/>
+              </a:fillRef>
+              <a:effectRef idx="0">
+                <a:schemeClr val="accent1"/>
+              </a:effectRef>
+              <a:fontRef idx="minor">
+                <a:schemeClr val="lt1"/>
+              </a:fontRef>
+            </p:style>
+            <p:txBody>
+              <a:bodyPr rtlCol="0" anchor="ctr"/>
+              <a:lstStyle/>
+              <a:p>
+                <a:pPr algn="ctr"/>
+                <a:endParaRPr lang="en-GB" dirty="0"/>
+              </a:p>
+              <a:p>
+                <a:pPr algn="ctr"/>
+                <a:endParaRPr lang="en-GB" dirty="0"/>
+              </a:p>
+            </p:txBody>
+          </p:sp>
+          <p:sp>
+            <p:nvSpPr>
+              <p:cNvPr id="71" name="TextBox 70">
+                <a:extLst>
+                  <a:ext uri="{FF2B5EF4-FFF2-40B4-BE49-F238E27FC236}">
+                    <a16:creationId xmlns:a16="http://schemas.microsoft.com/office/drawing/2014/main" id="{33AE99E7-4572-49B0-AEEE-8AE35843BF09}"/>
                   </a:ext>
                 </a:extLst>
               </p:cNvPr>
@@ -14170,60 +14367,15 @@
             </p:nvSpPr>
             <p:spPr>
               <a:xfrm>
-                <a:off x="3905552" y="4245745"/>
-                <a:ext cx="2560953" cy="598115"/>
+                <a:off x="4614244" y="4429391"/>
+                <a:ext cx="609593" cy="327920"/>
               </a:xfrm>
               <a:prstGeom prst="rect">
                 <a:avLst/>
               </a:prstGeom>
-              <a:solidFill>
-                <a:schemeClr val="tx1"/>
-              </a:solidFill>
-            </p:spPr>
-            <p:txBody>
-              <a:bodyPr wrap="square">
-                <a:noAutofit/>
-              </a:bodyPr>
-              <a:lstStyle/>
-              <a:p>
-                <a:endParaRPr lang="en-GB" sz="1600" b="1" dirty="0">
-                  <a:solidFill>
-                    <a:schemeClr val="bg1"/>
-                  </a:solidFill>
-                </a:endParaRPr>
-              </a:p>
-            </p:txBody>
-          </p:sp>
-          <p:sp>
-            <p:nvSpPr>
-              <p:cNvPr id="64" name="TextBox 63">
-                <a:extLst>
-                  <a:ext uri="{FF2B5EF4-FFF2-40B4-BE49-F238E27FC236}">
-                    <a16:creationId xmlns:a16="http://schemas.microsoft.com/office/drawing/2014/main" id="{AF5374CA-C253-458E-8EA8-C2B5C6A28C26}"/>
-                  </a:ext>
-                </a:extLst>
-              </p:cNvPr>
-              <p:cNvSpPr txBox="1"/>
-              <p:nvPr/>
-            </p:nvSpPr>
-            <p:spPr>
-              <a:xfrm>
-                <a:off x="4014813" y="4370015"/>
-                <a:ext cx="469580" cy="327920"/>
-              </a:xfrm>
-              <a:prstGeom prst="rect">
-                <a:avLst/>
-              </a:prstGeom>
-              <a:solidFill>
-                <a:schemeClr val="bg1"/>
-              </a:solidFill>
+              <a:noFill/>
               <a:ln w="6350">
-                <a:solidFill>
-                  <a:schemeClr val="tx1">
-                    <a:lumMod val="65000"/>
-                    <a:lumOff val="35000"/>
-                  </a:schemeClr>
-                </a:solidFill>
+                <a:noFill/>
               </a:ln>
             </p:spPr>
             <p:txBody>
@@ -14233,352 +14385,174 @@
               <a:lstStyle/>
               <a:p>
                 <a:r>
-                  <a:rPr lang="en-US" sz="1600" b="1" dirty="0">
+                  <a:rPr lang="en-US" sz="1000" b="1" dirty="0">
                     <a:latin typeface="Courier New" panose="02070309020205020404" pitchFamily="49" charset="0"/>
                     <a:cs typeface="Courier New" panose="02070309020205020404" pitchFamily="49" charset="0"/>
                   </a:rPr>
-                  <a:t>IL</a:t>
+                  <a:t>JIT</a:t>
                 </a:r>
-                <a:endParaRPr lang="en-GB" sz="1600" b="1" dirty="0"/>
+                <a:endParaRPr lang="en-GB" sz="1000" b="1" dirty="0"/>
               </a:p>
             </p:txBody>
           </p:sp>
-          <p:sp>
-            <p:nvSpPr>
-              <p:cNvPr id="69" name="TextBox 68">
-                <a:extLst>
-                  <a:ext uri="{FF2B5EF4-FFF2-40B4-BE49-F238E27FC236}">
-                    <a16:creationId xmlns:a16="http://schemas.microsoft.com/office/drawing/2014/main" id="{347EB9C2-C4F2-4028-8FFF-CCD3EAF5109E}"/>
-                  </a:ext>
-                </a:extLst>
-              </p:cNvPr>
-              <p:cNvSpPr txBox="1"/>
-              <p:nvPr/>
-            </p:nvSpPr>
-            <p:spPr>
-              <a:xfrm>
-                <a:off x="5354084" y="4370015"/>
-                <a:ext cx="953634" cy="327920"/>
-              </a:xfrm>
-              <a:prstGeom prst="rect">
-                <a:avLst/>
-              </a:prstGeom>
-              <a:solidFill>
-                <a:schemeClr val="bg1"/>
-              </a:solidFill>
-              <a:ln w="6350">
-                <a:solidFill>
-                  <a:schemeClr val="tx1">
-                    <a:lumMod val="65000"/>
-                    <a:lumOff val="35000"/>
-                  </a:schemeClr>
-                </a:solidFill>
-              </a:ln>
-            </p:spPr>
-            <p:txBody>
-              <a:bodyPr wrap="square">
-                <a:noAutofit/>
-              </a:bodyPr>
-              <a:lstStyle/>
-              <a:p>
-                <a:r>
-                  <a:rPr lang="en-US" sz="1600" b="1" dirty="0">
-                    <a:latin typeface="Courier New" panose="02070309020205020404" pitchFamily="49" charset="0"/>
-                    <a:cs typeface="Courier New" panose="02070309020205020404" pitchFamily="49" charset="0"/>
-                  </a:rPr>
-                  <a:t>X86 MC</a:t>
-                </a:r>
-                <a:endParaRPr lang="en-GB" sz="1600" b="1" dirty="0"/>
-              </a:p>
-            </p:txBody>
-          </p:sp>
-          <p:grpSp>
-            <p:nvGrpSpPr>
-              <p:cNvPr id="2" name="Group 1">
-                <a:extLst>
-                  <a:ext uri="{FF2B5EF4-FFF2-40B4-BE49-F238E27FC236}">
-                    <a16:creationId xmlns:a16="http://schemas.microsoft.com/office/drawing/2014/main" id="{B6C13115-87BD-4560-A3BC-A48FE47CBA84}"/>
-                  </a:ext>
-                </a:extLst>
-              </p:cNvPr>
-              <p:cNvGrpSpPr/>
-              <p:nvPr/>
-            </p:nvGrpSpPr>
-            <p:grpSpPr>
-              <a:xfrm>
-                <a:off x="4614244" y="4325879"/>
-                <a:ext cx="609593" cy="437762"/>
-                <a:chOff x="4614244" y="4325879"/>
-                <a:chExt cx="609593" cy="437762"/>
-              </a:xfrm>
-            </p:grpSpPr>
-            <p:sp>
-              <p:nvSpPr>
-                <p:cNvPr id="44" name="Arrow: Down 43">
-                  <a:extLst>
-                    <a:ext uri="{FF2B5EF4-FFF2-40B4-BE49-F238E27FC236}">
-                      <a16:creationId xmlns:a16="http://schemas.microsoft.com/office/drawing/2014/main" id="{D155E866-C5CA-4C40-89AB-43804112D9F1}"/>
-                    </a:ext>
-                  </a:extLst>
-                </p:cNvPr>
-                <p:cNvSpPr/>
-                <p:nvPr/>
-              </p:nvSpPr>
-              <p:spPr>
-                <a:xfrm rot="16200000">
-                  <a:off x="4700160" y="4256645"/>
-                  <a:ext cx="437762" cy="576230"/>
-                </a:xfrm>
-                <a:prstGeom prst="downArrow">
-                  <a:avLst/>
-                </a:prstGeom>
-                <a:solidFill>
-                  <a:schemeClr val="bg1"/>
-                </a:solidFill>
-                <a:ln>
-                  <a:solidFill>
-                    <a:schemeClr val="tx1">
-                      <a:lumMod val="75000"/>
-                      <a:lumOff val="25000"/>
-                    </a:schemeClr>
-                  </a:solidFill>
-                </a:ln>
-              </p:spPr>
-              <p:style>
-                <a:lnRef idx="2">
-                  <a:schemeClr val="accent1">
-                    <a:shade val="50000"/>
-                  </a:schemeClr>
-                </a:lnRef>
-                <a:fillRef idx="1">
-                  <a:schemeClr val="accent1"/>
-                </a:fillRef>
-                <a:effectRef idx="0">
-                  <a:schemeClr val="accent1"/>
-                </a:effectRef>
-                <a:fontRef idx="minor">
-                  <a:schemeClr val="lt1"/>
-                </a:fontRef>
-              </p:style>
-              <p:txBody>
-                <a:bodyPr rtlCol="0" anchor="ctr"/>
-                <a:lstStyle/>
-                <a:p>
-                  <a:pPr algn="ctr"/>
-                  <a:endParaRPr lang="en-GB" dirty="0"/>
-                </a:p>
-                <a:p>
-                  <a:pPr algn="ctr"/>
-                  <a:endParaRPr lang="en-GB" dirty="0"/>
-                </a:p>
-              </p:txBody>
-            </p:sp>
-            <p:sp>
-              <p:nvSpPr>
-                <p:cNvPr id="71" name="TextBox 70">
-                  <a:extLst>
-                    <a:ext uri="{FF2B5EF4-FFF2-40B4-BE49-F238E27FC236}">
-                      <a16:creationId xmlns:a16="http://schemas.microsoft.com/office/drawing/2014/main" id="{33AE99E7-4572-49B0-AEEE-8AE35843BF09}"/>
-                    </a:ext>
-                  </a:extLst>
-                </p:cNvPr>
-                <p:cNvSpPr txBox="1"/>
-                <p:nvPr/>
-              </p:nvSpPr>
-              <p:spPr>
-                <a:xfrm>
-                  <a:off x="4614244" y="4429391"/>
-                  <a:ext cx="609593" cy="327920"/>
-                </a:xfrm>
-                <a:prstGeom prst="rect">
-                  <a:avLst/>
-                </a:prstGeom>
-                <a:noFill/>
-                <a:ln w="6350">
-                  <a:solidFill>
-                    <a:schemeClr val="tx1">
-                      <a:lumMod val="65000"/>
-                      <a:lumOff val="35000"/>
-                    </a:schemeClr>
-                  </a:solidFill>
-                </a:ln>
-              </p:spPr>
-              <p:txBody>
-                <a:bodyPr wrap="square">
-                  <a:noAutofit/>
-                </a:bodyPr>
-                <a:lstStyle/>
-                <a:p>
-                  <a:r>
-                    <a:rPr lang="en-US" sz="1000" b="1" dirty="0">
-                      <a:latin typeface="Courier New" panose="02070309020205020404" pitchFamily="49" charset="0"/>
-                      <a:cs typeface="Courier New" panose="02070309020205020404" pitchFamily="49" charset="0"/>
-                    </a:rPr>
-                    <a:t>JIT</a:t>
-                  </a:r>
-                  <a:endParaRPr lang="en-GB" sz="1000" b="1" dirty="0"/>
-                </a:p>
-              </p:txBody>
-            </p:sp>
-          </p:grpSp>
         </p:grpSp>
-        <p:sp>
-          <p:nvSpPr>
-            <p:cNvPr id="76" name="TextBox 75">
-              <a:extLst>
-                <a:ext uri="{FF2B5EF4-FFF2-40B4-BE49-F238E27FC236}">
-                  <a16:creationId xmlns:a16="http://schemas.microsoft.com/office/drawing/2014/main" id="{9F3AEFFC-4B1C-4043-BB89-3272FB7DA2E4}"/>
-                </a:ext>
-              </a:extLst>
-            </p:cNvPr>
-            <p:cNvSpPr txBox="1"/>
-            <p:nvPr/>
-          </p:nvSpPr>
-          <p:spPr>
-            <a:xfrm>
-              <a:off x="2502280" y="1113244"/>
-              <a:ext cx="1490879" cy="584775"/>
-            </a:xfrm>
-            <a:prstGeom prst="rect">
-              <a:avLst/>
-            </a:prstGeom>
-            <a:noFill/>
-          </p:spPr>
-          <p:txBody>
-            <a:bodyPr wrap="square">
-              <a:spAutoFit/>
-            </a:bodyPr>
-            <a:lstStyle/>
-            <a:p>
-              <a:r>
-                <a:rPr lang="en-US" sz="1600" b="1" dirty="0">
-                  <a:latin typeface="Courier New" panose="02070309020205020404" pitchFamily="49" charset="0"/>
-                  <a:cs typeface="Courier New" panose="02070309020205020404" pitchFamily="49" charset="0"/>
-                </a:rPr>
-                <a:t>Native BBC BASIC</a:t>
-              </a:r>
-              <a:endParaRPr lang="en-GB" sz="1600" b="1" dirty="0"/>
-            </a:p>
-          </p:txBody>
-        </p:sp>
-        <p:sp>
-          <p:nvSpPr>
-            <p:cNvPr id="78" name="TextBox 77">
-              <a:extLst>
-                <a:ext uri="{FF2B5EF4-FFF2-40B4-BE49-F238E27FC236}">
-                  <a16:creationId xmlns:a16="http://schemas.microsoft.com/office/drawing/2014/main" id="{3B7AF7B7-FE67-4B5E-B8A3-61A376034A22}"/>
-                </a:ext>
-              </a:extLst>
-            </p:cNvPr>
-            <p:cNvSpPr txBox="1"/>
-            <p:nvPr/>
-          </p:nvSpPr>
-          <p:spPr>
-            <a:xfrm>
-              <a:off x="2812803" y="1858120"/>
-              <a:ext cx="1180356" cy="584775"/>
-            </a:xfrm>
-            <a:prstGeom prst="rect">
-              <a:avLst/>
-            </a:prstGeom>
-            <a:noFill/>
-          </p:spPr>
-          <p:txBody>
-            <a:bodyPr wrap="square">
-              <a:spAutoFit/>
-            </a:bodyPr>
-            <a:lstStyle/>
-            <a:p>
-              <a:r>
-                <a:rPr lang="en-US" sz="1600" b="1" dirty="0">
-                  <a:latin typeface="Courier New" panose="02070309020205020404" pitchFamily="49" charset="0"/>
-                  <a:cs typeface="Courier New" panose="02070309020205020404" pitchFamily="49" charset="0"/>
-                </a:rPr>
-                <a:t>Native 6502 MC</a:t>
-              </a:r>
-              <a:endParaRPr lang="en-GB" sz="1600" b="1" dirty="0"/>
-            </a:p>
-          </p:txBody>
-        </p:sp>
-        <p:sp>
-          <p:nvSpPr>
-            <p:cNvPr id="79" name="TextBox 78">
-              <a:extLst>
-                <a:ext uri="{FF2B5EF4-FFF2-40B4-BE49-F238E27FC236}">
-                  <a16:creationId xmlns:a16="http://schemas.microsoft.com/office/drawing/2014/main" id="{46B7F2C7-C107-4E44-86F6-782181B474C0}"/>
-                </a:ext>
-              </a:extLst>
-            </p:cNvPr>
-            <p:cNvSpPr txBox="1"/>
-            <p:nvPr/>
-          </p:nvSpPr>
-          <p:spPr>
-            <a:xfrm>
-              <a:off x="2812803" y="2549630"/>
-              <a:ext cx="1180356" cy="584775"/>
-            </a:xfrm>
-            <a:prstGeom prst="rect">
-              <a:avLst/>
-            </a:prstGeom>
-            <a:noFill/>
-          </p:spPr>
-          <p:txBody>
-            <a:bodyPr wrap="square">
-              <a:spAutoFit/>
-            </a:bodyPr>
-            <a:lstStyle/>
-            <a:p>
-              <a:r>
-                <a:rPr lang="en-US" sz="1600" b="1" dirty="0">
-                  <a:latin typeface="Courier New" panose="02070309020205020404" pitchFamily="49" charset="0"/>
-                  <a:cs typeface="Courier New" panose="02070309020205020404" pitchFamily="49" charset="0"/>
-                </a:rPr>
-                <a:t>Native 6502 MC</a:t>
-              </a:r>
-              <a:endParaRPr lang="en-GB" sz="1600" b="1" dirty="0"/>
-            </a:p>
-          </p:txBody>
-        </p:sp>
-        <p:sp>
-          <p:nvSpPr>
-            <p:cNvPr id="80" name="TextBox 79">
-              <a:extLst>
-                <a:ext uri="{FF2B5EF4-FFF2-40B4-BE49-F238E27FC236}">
-                  <a16:creationId xmlns:a16="http://schemas.microsoft.com/office/drawing/2014/main" id="{82DB942A-4C02-4F96-ABC4-687A11C35C44}"/>
-                </a:ext>
-              </a:extLst>
-            </p:cNvPr>
-            <p:cNvSpPr txBox="1"/>
-            <p:nvPr/>
-          </p:nvSpPr>
-          <p:spPr>
-            <a:xfrm>
-              <a:off x="766563" y="3522913"/>
-              <a:ext cx="1337699" cy="584775"/>
-            </a:xfrm>
-            <a:prstGeom prst="rect">
-              <a:avLst/>
-            </a:prstGeom>
-            <a:noFill/>
-          </p:spPr>
-          <p:txBody>
-            <a:bodyPr wrap="square">
-              <a:spAutoFit/>
-            </a:bodyPr>
-            <a:lstStyle/>
-            <a:p>
-              <a:r>
-                <a:rPr lang="en-US" sz="1600" b="1" dirty="0">
-                  <a:latin typeface="Courier New" panose="02070309020205020404" pitchFamily="49" charset="0"/>
-                  <a:cs typeface="Courier New" panose="02070309020205020404" pitchFamily="49" charset="0"/>
-                </a:rPr>
-                <a:t>Hardware emulation</a:t>
-              </a:r>
-              <a:endParaRPr lang="en-GB" sz="1600" b="1" dirty="0"/>
-            </a:p>
-          </p:txBody>
-        </p:sp>
       </p:grpSp>
+      <p:sp>
+        <p:nvSpPr>
+          <p:cNvPr id="76" name="TextBox 75">
+            <a:extLst>
+              <a:ext uri="{FF2B5EF4-FFF2-40B4-BE49-F238E27FC236}">
+                <a16:creationId xmlns:a16="http://schemas.microsoft.com/office/drawing/2014/main" id="{9F3AEFFC-4B1C-4043-BB89-3272FB7DA2E4}"/>
+              </a:ext>
+            </a:extLst>
+          </p:cNvPr>
+          <p:cNvSpPr txBox="1"/>
+          <p:nvPr/>
+        </p:nvSpPr>
+        <p:spPr>
+          <a:xfrm>
+            <a:off x="3416680" y="1151572"/>
+            <a:ext cx="1490879" cy="584775"/>
+          </a:xfrm>
+          <a:prstGeom prst="rect">
+            <a:avLst/>
+          </a:prstGeom>
+          <a:noFill/>
+        </p:spPr>
+        <p:txBody>
+          <a:bodyPr wrap="square">
+            <a:spAutoFit/>
+          </a:bodyPr>
+          <a:lstStyle/>
+          <a:p>
+            <a:r>
+              <a:rPr lang="en-US" sz="1600" b="1" dirty="0">
+                <a:latin typeface="Courier New" panose="02070309020205020404" pitchFamily="49" charset="0"/>
+                <a:cs typeface="Courier New" panose="02070309020205020404" pitchFamily="49" charset="0"/>
+              </a:rPr>
+              <a:t>Native BBC BASIC</a:t>
+            </a:r>
+            <a:endParaRPr lang="en-GB" sz="1600" b="1" dirty="0"/>
+          </a:p>
+        </p:txBody>
+      </p:sp>
+      <p:sp>
+        <p:nvSpPr>
+          <p:cNvPr id="78" name="TextBox 77">
+            <a:extLst>
+              <a:ext uri="{FF2B5EF4-FFF2-40B4-BE49-F238E27FC236}">
+                <a16:creationId xmlns:a16="http://schemas.microsoft.com/office/drawing/2014/main" id="{3B7AF7B7-FE67-4B5E-B8A3-61A376034A22}"/>
+              </a:ext>
+            </a:extLst>
+          </p:cNvPr>
+          <p:cNvSpPr txBox="1"/>
+          <p:nvPr/>
+        </p:nvSpPr>
+        <p:spPr>
+          <a:xfrm>
+            <a:off x="3727203" y="1896448"/>
+            <a:ext cx="1180356" cy="584775"/>
+          </a:xfrm>
+          <a:prstGeom prst="rect">
+            <a:avLst/>
+          </a:prstGeom>
+          <a:noFill/>
+        </p:spPr>
+        <p:txBody>
+          <a:bodyPr wrap="square">
+            <a:spAutoFit/>
+          </a:bodyPr>
+          <a:lstStyle/>
+          <a:p>
+            <a:r>
+              <a:rPr lang="en-US" sz="1600" b="1" dirty="0">
+                <a:latin typeface="Courier New" panose="02070309020205020404" pitchFamily="49" charset="0"/>
+                <a:cs typeface="Courier New" panose="02070309020205020404" pitchFamily="49" charset="0"/>
+              </a:rPr>
+              <a:t>Native 6502 MC</a:t>
+            </a:r>
+            <a:endParaRPr lang="en-GB" sz="1600" b="1" dirty="0"/>
+          </a:p>
+        </p:txBody>
+      </p:sp>
+      <p:sp>
+        <p:nvSpPr>
+          <p:cNvPr id="79" name="TextBox 78">
+            <a:extLst>
+              <a:ext uri="{FF2B5EF4-FFF2-40B4-BE49-F238E27FC236}">
+                <a16:creationId xmlns:a16="http://schemas.microsoft.com/office/drawing/2014/main" id="{46B7F2C7-C107-4E44-86F6-782181B474C0}"/>
+              </a:ext>
+            </a:extLst>
+          </p:cNvPr>
+          <p:cNvSpPr txBox="1"/>
+          <p:nvPr/>
+        </p:nvSpPr>
+        <p:spPr>
+          <a:xfrm>
+            <a:off x="3727203" y="2587958"/>
+            <a:ext cx="1180356" cy="584775"/>
+          </a:xfrm>
+          <a:prstGeom prst="rect">
+            <a:avLst/>
+          </a:prstGeom>
+          <a:noFill/>
+        </p:spPr>
+        <p:txBody>
+          <a:bodyPr wrap="square">
+            <a:spAutoFit/>
+          </a:bodyPr>
+          <a:lstStyle/>
+          <a:p>
+            <a:r>
+              <a:rPr lang="en-US" sz="1600" b="1" dirty="0">
+                <a:latin typeface="Courier New" panose="02070309020205020404" pitchFamily="49" charset="0"/>
+                <a:cs typeface="Courier New" panose="02070309020205020404" pitchFamily="49" charset="0"/>
+              </a:rPr>
+              <a:t>Native 6502 MC</a:t>
+            </a:r>
+            <a:endParaRPr lang="en-GB" sz="1600" b="1" dirty="0"/>
+          </a:p>
+        </p:txBody>
+      </p:sp>
+      <p:sp>
+        <p:nvSpPr>
+          <p:cNvPr id="80" name="TextBox 79">
+            <a:extLst>
+              <a:ext uri="{FF2B5EF4-FFF2-40B4-BE49-F238E27FC236}">
+                <a16:creationId xmlns:a16="http://schemas.microsoft.com/office/drawing/2014/main" id="{82DB942A-4C02-4F96-ABC4-687A11C35C44}"/>
+              </a:ext>
+            </a:extLst>
+          </p:cNvPr>
+          <p:cNvSpPr txBox="1"/>
+          <p:nvPr/>
+        </p:nvSpPr>
+        <p:spPr>
+          <a:xfrm>
+            <a:off x="1680963" y="3561241"/>
+            <a:ext cx="1337699" cy="584775"/>
+          </a:xfrm>
+          <a:prstGeom prst="rect">
+            <a:avLst/>
+          </a:prstGeom>
+          <a:noFill/>
+        </p:spPr>
+        <p:txBody>
+          <a:bodyPr wrap="square">
+            <a:spAutoFit/>
+          </a:bodyPr>
+          <a:lstStyle/>
+          <a:p>
+            <a:r>
+              <a:rPr lang="en-US" sz="1600" b="1" dirty="0">
+                <a:latin typeface="Courier New" panose="02070309020205020404" pitchFamily="49" charset="0"/>
+                <a:cs typeface="Courier New" panose="02070309020205020404" pitchFamily="49" charset="0"/>
+              </a:rPr>
+              <a:t>Hardware emulation</a:t>
+            </a:r>
+            <a:endParaRPr lang="en-GB" sz="1600" b="1" dirty="0"/>
+          </a:p>
+        </p:txBody>
+      </p:sp>
     </p:spTree>
     <p:extLst>
       <p:ext uri="{BB962C8B-B14F-4D97-AF65-F5344CB8AC3E}">
@@ -18336,7 +18310,7 @@
         <p:spPr/>
         <p:txBody>
           <a:bodyPr>
-            <a:normAutofit fontScale="90000"/>
+            <a:normAutofit/>
           </a:bodyPr>
           <a:lstStyle/>
           <a:p>

</xml_diff>